<commit_message>
Fixed not working update * Added application icon in WIN32
</commit_message>
<xml_diff>
--- a/images/icons.pptx
+++ b/images/icons.pptx
@@ -5,11 +5,12 @@
     <p:sldMasterId id="2147483648" r:id="rId1"/>
   </p:sldMasterIdLst>
   <p:notesMasterIdLst>
-    <p:notesMasterId r:id="rId4"/>
+    <p:notesMasterId r:id="rId5"/>
   </p:notesMasterIdLst>
   <p:sldIdLst>
     <p:sldId id="260" r:id="rId2"/>
     <p:sldId id="261" r:id="rId3"/>
+    <p:sldId id="262" r:id="rId4"/>
   </p:sldIdLst>
   <p:sldSz cx="9144000" cy="6858000" type="screen4x3"/>
   <p:notesSz cx="6858000" cy="9144000"/>
@@ -193,7 +194,7 @@
           <a:p>
             <a:fld id="{B07FD8AA-08B1-4E21-91DC-E5B90EA588FD}" type="datetimeFigureOut">
               <a:rPr lang="en-US" smtClean="0"/>
-              <a:t>4/29/2014</a:t>
+              <a:t>4/30/2014</a:t>
             </a:fld>
             <a:endParaRPr lang="en-US"/>
           </a:p>
@@ -642,7 +643,7 @@
           <a:p>
             <a:fld id="{A89232D8-0A1F-4BDD-A9E7-2D079E857A7E}" type="datetimeFigureOut">
               <a:rPr lang="en-US" smtClean="0"/>
-              <a:t>4/29/2014</a:t>
+              <a:t>4/30/2014</a:t>
             </a:fld>
             <a:endParaRPr lang="en-US"/>
           </a:p>
@@ -812,7 +813,7 @@
           <a:p>
             <a:fld id="{A89232D8-0A1F-4BDD-A9E7-2D079E857A7E}" type="datetimeFigureOut">
               <a:rPr lang="en-US" smtClean="0"/>
-              <a:t>4/29/2014</a:t>
+              <a:t>4/30/2014</a:t>
             </a:fld>
             <a:endParaRPr lang="en-US"/>
           </a:p>
@@ -992,7 +993,7 @@
           <a:p>
             <a:fld id="{A89232D8-0A1F-4BDD-A9E7-2D079E857A7E}" type="datetimeFigureOut">
               <a:rPr lang="en-US" smtClean="0"/>
-              <a:t>4/29/2014</a:t>
+              <a:t>4/30/2014</a:t>
             </a:fld>
             <a:endParaRPr lang="en-US"/>
           </a:p>
@@ -1162,7 +1163,7 @@
           <a:p>
             <a:fld id="{A89232D8-0A1F-4BDD-A9E7-2D079E857A7E}" type="datetimeFigureOut">
               <a:rPr lang="en-US" smtClean="0"/>
-              <a:t>4/29/2014</a:t>
+              <a:t>4/30/2014</a:t>
             </a:fld>
             <a:endParaRPr lang="en-US"/>
           </a:p>
@@ -1408,7 +1409,7 @@
           <a:p>
             <a:fld id="{A89232D8-0A1F-4BDD-A9E7-2D079E857A7E}" type="datetimeFigureOut">
               <a:rPr lang="en-US" smtClean="0"/>
-              <a:t>4/29/2014</a:t>
+              <a:t>4/30/2014</a:t>
             </a:fld>
             <a:endParaRPr lang="en-US"/>
           </a:p>
@@ -1696,7 +1697,7 @@
           <a:p>
             <a:fld id="{A89232D8-0A1F-4BDD-A9E7-2D079E857A7E}" type="datetimeFigureOut">
               <a:rPr lang="en-US" smtClean="0"/>
-              <a:t>4/29/2014</a:t>
+              <a:t>4/30/2014</a:t>
             </a:fld>
             <a:endParaRPr lang="en-US"/>
           </a:p>
@@ -2118,7 +2119,7 @@
           <a:p>
             <a:fld id="{A89232D8-0A1F-4BDD-A9E7-2D079E857A7E}" type="datetimeFigureOut">
               <a:rPr lang="en-US" smtClean="0"/>
-              <a:t>4/29/2014</a:t>
+              <a:t>4/30/2014</a:t>
             </a:fld>
             <a:endParaRPr lang="en-US"/>
           </a:p>
@@ -2236,7 +2237,7 @@
           <a:p>
             <a:fld id="{A89232D8-0A1F-4BDD-A9E7-2D079E857A7E}" type="datetimeFigureOut">
               <a:rPr lang="en-US" smtClean="0"/>
-              <a:t>4/29/2014</a:t>
+              <a:t>4/30/2014</a:t>
             </a:fld>
             <a:endParaRPr lang="en-US"/>
           </a:p>
@@ -2331,7 +2332,7 @@
           <a:p>
             <a:fld id="{A89232D8-0A1F-4BDD-A9E7-2D079E857A7E}" type="datetimeFigureOut">
               <a:rPr lang="en-US" smtClean="0"/>
-              <a:t>4/29/2014</a:t>
+              <a:t>4/30/2014</a:t>
             </a:fld>
             <a:endParaRPr lang="en-US"/>
           </a:p>
@@ -2608,7 +2609,7 @@
           <a:p>
             <a:fld id="{A89232D8-0A1F-4BDD-A9E7-2D079E857A7E}" type="datetimeFigureOut">
               <a:rPr lang="en-US" smtClean="0"/>
-              <a:t>4/29/2014</a:t>
+              <a:t>4/30/2014</a:t>
             </a:fld>
             <a:endParaRPr lang="en-US"/>
           </a:p>
@@ -2861,7 +2862,7 @@
           <a:p>
             <a:fld id="{A89232D8-0A1F-4BDD-A9E7-2D079E857A7E}" type="datetimeFigureOut">
               <a:rPr lang="en-US" smtClean="0"/>
-              <a:t>4/29/2014</a:t>
+              <a:t>4/30/2014</a:t>
             </a:fld>
             <a:endParaRPr lang="en-US"/>
           </a:p>
@@ -3074,7 +3075,7 @@
           <a:p>
             <a:fld id="{A89232D8-0A1F-4BDD-A9E7-2D079E857A7E}" type="datetimeFigureOut">
               <a:rPr lang="en-US" smtClean="0"/>
-              <a:t>4/29/2014</a:t>
+              <a:t>4/30/2014</a:t>
             </a:fld>
             <a:endParaRPr lang="en-US"/>
           </a:p>
@@ -7436,6 +7437,1697 @@
 </p:sld>
 </file>
 
+<file path=ppt/slides/slide3.xml><?xml version="1.0" encoding="utf-8"?>
+<p:sld xmlns:a="http://schemas.openxmlformats.org/drawingml/2006/main" xmlns:r="http://schemas.openxmlformats.org/officeDocument/2006/relationships" xmlns:p="http://schemas.openxmlformats.org/presentationml/2006/main">
+  <p:cSld>
+    <p:spTree>
+      <p:nvGrpSpPr>
+        <p:cNvPr id="1" name=""/>
+        <p:cNvGrpSpPr/>
+        <p:nvPr/>
+      </p:nvGrpSpPr>
+      <p:grpSpPr>
+        <a:xfrm>
+          <a:off x="0" y="0"/>
+          <a:ext cx="0" cy="0"/>
+          <a:chOff x="0" y="0"/>
+          <a:chExt cx="0" cy="0"/>
+        </a:xfrm>
+      </p:grpSpPr>
+      <p:grpSp>
+        <p:nvGrpSpPr>
+          <p:cNvPr id="43" name="Group 42"/>
+          <p:cNvGrpSpPr/>
+          <p:nvPr/>
+        </p:nvGrpSpPr>
+        <p:grpSpPr>
+          <a:xfrm>
+            <a:off x="243719" y="-2371187"/>
+            <a:ext cx="8713908" cy="8713908"/>
+            <a:chOff x="544392" y="1313999"/>
+            <a:chExt cx="4064401" cy="4064401"/>
+          </a:xfrm>
+        </p:grpSpPr>
+        <p:sp>
+          <p:nvSpPr>
+            <p:cNvPr id="4" name="Oval 3"/>
+            <p:cNvSpPr/>
+            <p:nvPr/>
+          </p:nvSpPr>
+          <p:spPr>
+            <a:xfrm>
+              <a:off x="544392" y="1313999"/>
+              <a:ext cx="4064401" cy="4064401"/>
+            </a:xfrm>
+            <a:prstGeom prst="ellipse">
+              <a:avLst/>
+            </a:prstGeom>
+            <a:solidFill>
+              <a:schemeClr val="accent1">
+                <a:lumMod val="75000"/>
+              </a:schemeClr>
+            </a:solidFill>
+            <a:ln>
+              <a:noFill/>
+            </a:ln>
+          </p:spPr>
+          <p:style>
+            <a:lnRef idx="2">
+              <a:schemeClr val="accent1">
+                <a:shade val="50000"/>
+              </a:schemeClr>
+            </a:lnRef>
+            <a:fillRef idx="1">
+              <a:schemeClr val="accent1"/>
+            </a:fillRef>
+            <a:effectRef idx="0">
+              <a:schemeClr val="accent1"/>
+            </a:effectRef>
+            <a:fontRef idx="minor">
+              <a:schemeClr val="lt1"/>
+            </a:fontRef>
+          </p:style>
+          <p:txBody>
+            <a:bodyPr rtlCol="0" anchor="ctr"/>
+            <a:lstStyle/>
+            <a:p>
+              <a:pPr algn="ctr"/>
+              <a:endParaRPr lang="en-US"/>
+            </a:p>
+          </p:txBody>
+        </p:sp>
+        <p:grpSp>
+          <p:nvGrpSpPr>
+            <p:cNvPr id="42" name="Group 41"/>
+            <p:cNvGrpSpPr/>
+            <p:nvPr/>
+          </p:nvGrpSpPr>
+          <p:grpSpPr>
+            <a:xfrm>
+              <a:off x="1480739" y="2052225"/>
+              <a:ext cx="2191706" cy="2587947"/>
+              <a:chOff x="1480739" y="2052225"/>
+              <a:chExt cx="2191706" cy="2587947"/>
+            </a:xfrm>
+          </p:grpSpPr>
+          <p:grpSp>
+            <p:nvGrpSpPr>
+              <p:cNvPr id="5" name="Group 4"/>
+              <p:cNvGrpSpPr/>
+              <p:nvPr/>
+            </p:nvGrpSpPr>
+            <p:grpSpPr>
+              <a:xfrm>
+                <a:off x="1480739" y="2052227"/>
+                <a:ext cx="2068501" cy="2587945"/>
+                <a:chOff x="3352800" y="2400926"/>
+                <a:chExt cx="2171712" cy="2717074"/>
+              </a:xfrm>
+            </p:grpSpPr>
+            <p:sp>
+              <p:nvSpPr>
+                <p:cNvPr id="6" name="Round Same Side Corner Rectangle 5"/>
+                <p:cNvSpPr/>
+                <p:nvPr/>
+              </p:nvSpPr>
+              <p:spPr>
+                <a:xfrm>
+                  <a:off x="3352801" y="2400926"/>
+                  <a:ext cx="2006585" cy="2717074"/>
+                </a:xfrm>
+                <a:prstGeom prst="round2SameRect">
+                  <a:avLst>
+                    <a:gd name="adj1" fmla="val 22832"/>
+                    <a:gd name="adj2" fmla="val 13118"/>
+                  </a:avLst>
+                </a:prstGeom>
+                <a:solidFill>
+                  <a:schemeClr val="bg1"/>
+                </a:solidFill>
+                <a:ln>
+                  <a:noFill/>
+                </a:ln>
+              </p:spPr>
+              <p:style>
+                <a:lnRef idx="2">
+                  <a:schemeClr val="accent1">
+                    <a:shade val="50000"/>
+                  </a:schemeClr>
+                </a:lnRef>
+                <a:fillRef idx="1">
+                  <a:schemeClr val="accent1"/>
+                </a:fillRef>
+                <a:effectRef idx="0">
+                  <a:schemeClr val="accent1"/>
+                </a:effectRef>
+                <a:fontRef idx="minor">
+                  <a:schemeClr val="lt1"/>
+                </a:fontRef>
+              </p:style>
+              <p:txBody>
+                <a:bodyPr rtlCol="0" anchor="ctr"/>
+                <a:lstStyle/>
+                <a:p>
+                  <a:pPr algn="ctr"/>
+                  <a:endParaRPr lang="en-US"/>
+                </a:p>
+              </p:txBody>
+            </p:sp>
+            <p:sp>
+              <p:nvSpPr>
+                <p:cNvPr id="7" name="Round Same Side Corner Rectangle 6"/>
+                <p:cNvSpPr/>
+                <p:nvPr/>
+              </p:nvSpPr>
+              <p:spPr>
+                <a:xfrm>
+                  <a:off x="3352800" y="2400926"/>
+                  <a:ext cx="1942170" cy="494674"/>
+                </a:xfrm>
+                <a:prstGeom prst="round2SameRect">
+                  <a:avLst>
+                    <a:gd name="adj1" fmla="val 50000"/>
+                    <a:gd name="adj2" fmla="val 0"/>
+                  </a:avLst>
+                </a:prstGeom>
+                <a:solidFill>
+                  <a:schemeClr val="bg1">
+                    <a:lumMod val="85000"/>
+                  </a:schemeClr>
+                </a:solidFill>
+                <a:ln>
+                  <a:noFill/>
+                </a:ln>
+              </p:spPr>
+              <p:style>
+                <a:lnRef idx="2">
+                  <a:schemeClr val="accent1">
+                    <a:shade val="50000"/>
+                  </a:schemeClr>
+                </a:lnRef>
+                <a:fillRef idx="1">
+                  <a:schemeClr val="accent1"/>
+                </a:fillRef>
+                <a:effectRef idx="0">
+                  <a:schemeClr val="accent1"/>
+                </a:effectRef>
+                <a:fontRef idx="minor">
+                  <a:schemeClr val="lt1"/>
+                </a:fontRef>
+              </p:style>
+              <p:txBody>
+                <a:bodyPr rtlCol="0" anchor="ctr"/>
+                <a:lstStyle/>
+                <a:p>
+                  <a:pPr algn="ctr"/>
+                  <a:endParaRPr lang="en-US"/>
+                </a:p>
+              </p:txBody>
+            </p:sp>
+            <p:grpSp>
+              <p:nvGrpSpPr>
+                <p:cNvPr id="8" name="Group 7"/>
+                <p:cNvGrpSpPr>
+                  <a:grpSpLocks noChangeAspect="1"/>
+                </p:cNvGrpSpPr>
+                <p:nvPr/>
+              </p:nvGrpSpPr>
+              <p:grpSpPr>
+                <a:xfrm>
+                  <a:off x="3581400" y="2560633"/>
+                  <a:ext cx="876300" cy="175260"/>
+                  <a:chOff x="2590800" y="5791200"/>
+                  <a:chExt cx="381000" cy="76200"/>
+                </a:xfrm>
+              </p:grpSpPr>
+              <p:sp>
+                <p:nvSpPr>
+                  <p:cNvPr id="24" name="Oval 23"/>
+                  <p:cNvSpPr/>
+                  <p:nvPr/>
+                </p:nvSpPr>
+                <p:spPr>
+                  <a:xfrm>
+                    <a:off x="2590800" y="5791200"/>
+                    <a:ext cx="76200" cy="76200"/>
+                  </a:xfrm>
+                  <a:prstGeom prst="ellipse">
+                    <a:avLst/>
+                  </a:prstGeom>
+                  <a:solidFill>
+                    <a:srgbClr val="EB5A5A"/>
+                  </a:solidFill>
+                  <a:ln>
+                    <a:noFill/>
+                  </a:ln>
+                </p:spPr>
+                <p:style>
+                  <a:lnRef idx="2">
+                    <a:schemeClr val="accent1">
+                      <a:shade val="50000"/>
+                    </a:schemeClr>
+                  </a:lnRef>
+                  <a:fillRef idx="1">
+                    <a:schemeClr val="accent1"/>
+                  </a:fillRef>
+                  <a:effectRef idx="0">
+                    <a:schemeClr val="accent1"/>
+                  </a:effectRef>
+                  <a:fontRef idx="minor">
+                    <a:schemeClr val="lt1"/>
+                  </a:fontRef>
+                </p:style>
+                <p:txBody>
+                  <a:bodyPr rtlCol="0" anchor="ctr"/>
+                  <a:lstStyle/>
+                  <a:p>
+                    <a:pPr algn="ctr"/>
+                    <a:endParaRPr lang="en-US"/>
+                  </a:p>
+                </p:txBody>
+              </p:sp>
+              <p:sp>
+                <p:nvSpPr>
+                  <p:cNvPr id="25" name="Oval 24"/>
+                  <p:cNvSpPr/>
+                  <p:nvPr/>
+                </p:nvSpPr>
+                <p:spPr>
+                  <a:xfrm>
+                    <a:off x="2743200" y="5791200"/>
+                    <a:ext cx="76200" cy="76200"/>
+                  </a:xfrm>
+                  <a:prstGeom prst="ellipse">
+                    <a:avLst/>
+                  </a:prstGeom>
+                  <a:solidFill>
+                    <a:srgbClr val="E6B450"/>
+                  </a:solidFill>
+                  <a:ln>
+                    <a:noFill/>
+                  </a:ln>
+                </p:spPr>
+                <p:style>
+                  <a:lnRef idx="2">
+                    <a:schemeClr val="accent1">
+                      <a:shade val="50000"/>
+                    </a:schemeClr>
+                  </a:lnRef>
+                  <a:fillRef idx="1">
+                    <a:schemeClr val="accent1"/>
+                  </a:fillRef>
+                  <a:effectRef idx="0">
+                    <a:schemeClr val="accent1"/>
+                  </a:effectRef>
+                  <a:fontRef idx="minor">
+                    <a:schemeClr val="lt1"/>
+                  </a:fontRef>
+                </p:style>
+                <p:txBody>
+                  <a:bodyPr rtlCol="0" anchor="ctr"/>
+                  <a:lstStyle/>
+                  <a:p>
+                    <a:pPr algn="ctr"/>
+                    <a:endParaRPr lang="en-US"/>
+                  </a:p>
+                </p:txBody>
+              </p:sp>
+              <p:sp>
+                <p:nvSpPr>
+                  <p:cNvPr id="26" name="Oval 25"/>
+                  <p:cNvSpPr/>
+                  <p:nvPr/>
+                </p:nvSpPr>
+                <p:spPr>
+                  <a:xfrm>
+                    <a:off x="2895600" y="5791200"/>
+                    <a:ext cx="76200" cy="76200"/>
+                  </a:xfrm>
+                  <a:prstGeom prst="ellipse">
+                    <a:avLst/>
+                  </a:prstGeom>
+                  <a:solidFill>
+                    <a:srgbClr val="78B946"/>
+                  </a:solidFill>
+                  <a:ln>
+                    <a:noFill/>
+                  </a:ln>
+                </p:spPr>
+                <p:style>
+                  <a:lnRef idx="2">
+                    <a:schemeClr val="accent1">
+                      <a:shade val="50000"/>
+                    </a:schemeClr>
+                  </a:lnRef>
+                  <a:fillRef idx="1">
+                    <a:schemeClr val="accent1"/>
+                  </a:fillRef>
+                  <a:effectRef idx="0">
+                    <a:schemeClr val="accent1"/>
+                  </a:effectRef>
+                  <a:fontRef idx="minor">
+                    <a:schemeClr val="lt1"/>
+                  </a:fontRef>
+                </p:style>
+                <p:txBody>
+                  <a:bodyPr rtlCol="0" anchor="ctr"/>
+                  <a:lstStyle/>
+                  <a:p>
+                    <a:pPr algn="ctr"/>
+                    <a:endParaRPr lang="en-US"/>
+                  </a:p>
+                </p:txBody>
+              </p:sp>
+            </p:grpSp>
+            <p:sp>
+              <p:nvSpPr>
+                <p:cNvPr id="9" name="Rectangle 8"/>
+                <p:cNvSpPr/>
+                <p:nvPr/>
+              </p:nvSpPr>
+              <p:spPr>
+                <a:xfrm>
+                  <a:off x="3619489" y="3123880"/>
+                  <a:ext cx="1905023" cy="515639"/>
+                </a:xfrm>
+                <a:prstGeom prst="rect">
+                  <a:avLst/>
+                </a:prstGeom>
+                <a:solidFill>
+                  <a:schemeClr val="bg1">
+                    <a:lumMod val="85000"/>
+                  </a:schemeClr>
+                </a:solidFill>
+                <a:ln>
+                  <a:noFill/>
+                </a:ln>
+              </p:spPr>
+              <p:style>
+                <a:lnRef idx="2">
+                  <a:schemeClr val="accent1">
+                    <a:shade val="50000"/>
+                  </a:schemeClr>
+                </a:lnRef>
+                <a:fillRef idx="1">
+                  <a:schemeClr val="accent1"/>
+                </a:fillRef>
+                <a:effectRef idx="0">
+                  <a:schemeClr val="accent1"/>
+                </a:effectRef>
+                <a:fontRef idx="minor">
+                  <a:schemeClr val="lt1"/>
+                </a:fontRef>
+              </p:style>
+              <p:txBody>
+                <a:bodyPr rtlCol="0" anchor="ctr"/>
+                <a:lstStyle/>
+                <a:p>
+                  <a:pPr algn="ctr"/>
+                  <a:endParaRPr lang="en-US"/>
+                </a:p>
+              </p:txBody>
+            </p:sp>
+            <p:sp>
+              <p:nvSpPr>
+                <p:cNvPr id="10" name="Rectangle 9"/>
+                <p:cNvSpPr/>
+                <p:nvPr/>
+              </p:nvSpPr>
+              <p:spPr>
+                <a:xfrm>
+                  <a:off x="3619489" y="3716051"/>
+                  <a:ext cx="814126" cy="515639"/>
+                </a:xfrm>
+                <a:prstGeom prst="rect">
+                  <a:avLst/>
+                </a:prstGeom>
+                <a:solidFill>
+                  <a:schemeClr val="bg1">
+                    <a:lumMod val="85000"/>
+                  </a:schemeClr>
+                </a:solidFill>
+                <a:ln>
+                  <a:noFill/>
+                </a:ln>
+              </p:spPr>
+              <p:style>
+                <a:lnRef idx="2">
+                  <a:schemeClr val="accent1">
+                    <a:shade val="50000"/>
+                  </a:schemeClr>
+                </a:lnRef>
+                <a:fillRef idx="1">
+                  <a:schemeClr val="accent1"/>
+                </a:fillRef>
+                <a:effectRef idx="0">
+                  <a:schemeClr val="accent1"/>
+                </a:effectRef>
+                <a:fontRef idx="minor">
+                  <a:schemeClr val="lt1"/>
+                </a:fontRef>
+              </p:style>
+              <p:txBody>
+                <a:bodyPr rtlCol="0" anchor="ctr"/>
+                <a:lstStyle/>
+                <a:p>
+                  <a:pPr algn="ctr"/>
+                  <a:endParaRPr lang="en-US"/>
+                </a:p>
+              </p:txBody>
+            </p:sp>
+            <p:sp>
+              <p:nvSpPr>
+                <p:cNvPr id="11" name="Rectangle 10"/>
+                <p:cNvSpPr/>
+                <p:nvPr/>
+              </p:nvSpPr>
+              <p:spPr>
+                <a:xfrm>
+                  <a:off x="4527643" y="3716050"/>
+                  <a:ext cx="996869" cy="515639"/>
+                </a:xfrm>
+                <a:prstGeom prst="rect">
+                  <a:avLst/>
+                </a:prstGeom>
+                <a:solidFill>
+                  <a:schemeClr val="bg1">
+                    <a:lumMod val="85000"/>
+                  </a:schemeClr>
+                </a:solidFill>
+                <a:ln>
+                  <a:noFill/>
+                </a:ln>
+              </p:spPr>
+              <p:style>
+                <a:lnRef idx="2">
+                  <a:schemeClr val="accent1">
+                    <a:shade val="50000"/>
+                  </a:schemeClr>
+                </a:lnRef>
+                <a:fillRef idx="1">
+                  <a:schemeClr val="accent1"/>
+                </a:fillRef>
+                <a:effectRef idx="0">
+                  <a:schemeClr val="accent1"/>
+                </a:effectRef>
+                <a:fontRef idx="minor">
+                  <a:schemeClr val="lt1"/>
+                </a:fontRef>
+              </p:style>
+              <p:txBody>
+                <a:bodyPr rtlCol="0" anchor="ctr"/>
+                <a:lstStyle/>
+                <a:p>
+                  <a:pPr algn="ctr"/>
+                  <a:endParaRPr lang="en-US"/>
+                </a:p>
+              </p:txBody>
+            </p:sp>
+            <p:grpSp>
+              <p:nvGrpSpPr>
+                <p:cNvPr id="12" name="Group 11"/>
+                <p:cNvGrpSpPr/>
+                <p:nvPr/>
+              </p:nvGrpSpPr>
+              <p:grpSpPr>
+                <a:xfrm>
+                  <a:off x="4530486" y="4308220"/>
+                  <a:ext cx="989456" cy="132691"/>
+                  <a:chOff x="4282439" y="4349114"/>
+                  <a:chExt cx="1338536" cy="175261"/>
+                </a:xfrm>
+              </p:grpSpPr>
+              <p:sp>
+                <p:nvSpPr>
+                  <p:cNvPr id="22" name="Rectangle 21"/>
+                  <p:cNvSpPr/>
+                  <p:nvPr/>
+                </p:nvSpPr>
+                <p:spPr>
+                  <a:xfrm>
+                    <a:off x="4557651" y="4349115"/>
+                    <a:ext cx="1063324" cy="175260"/>
+                  </a:xfrm>
+                  <a:prstGeom prst="rect">
+                    <a:avLst/>
+                  </a:prstGeom>
+                  <a:solidFill>
+                    <a:schemeClr val="bg1">
+                      <a:lumMod val="85000"/>
+                    </a:schemeClr>
+                  </a:solidFill>
+                  <a:ln>
+                    <a:noFill/>
+                  </a:ln>
+                </p:spPr>
+                <p:style>
+                  <a:lnRef idx="2">
+                    <a:schemeClr val="accent1">
+                      <a:shade val="50000"/>
+                    </a:schemeClr>
+                  </a:lnRef>
+                  <a:fillRef idx="1">
+                    <a:schemeClr val="accent1"/>
+                  </a:fillRef>
+                  <a:effectRef idx="0">
+                    <a:schemeClr val="accent1"/>
+                  </a:effectRef>
+                  <a:fontRef idx="minor">
+                    <a:schemeClr val="lt1"/>
+                  </a:fontRef>
+                </p:style>
+                <p:txBody>
+                  <a:bodyPr rtlCol="0" anchor="ctr"/>
+                  <a:lstStyle/>
+                  <a:p>
+                    <a:pPr algn="ctr"/>
+                    <a:endParaRPr lang="en-US"/>
+                  </a:p>
+                </p:txBody>
+              </p:sp>
+              <p:sp>
+                <p:nvSpPr>
+                  <p:cNvPr id="23" name="Oval 22"/>
+                  <p:cNvSpPr/>
+                  <p:nvPr/>
+                </p:nvSpPr>
+                <p:spPr>
+                  <a:xfrm>
+                    <a:off x="4282439" y="4349114"/>
+                    <a:ext cx="185550" cy="175260"/>
+                  </a:xfrm>
+                  <a:prstGeom prst="ellipse">
+                    <a:avLst/>
+                  </a:prstGeom>
+                  <a:solidFill>
+                    <a:srgbClr val="78B946"/>
+                  </a:solidFill>
+                  <a:ln>
+                    <a:noFill/>
+                  </a:ln>
+                </p:spPr>
+                <p:style>
+                  <a:lnRef idx="2">
+                    <a:schemeClr val="accent1">
+                      <a:shade val="50000"/>
+                    </a:schemeClr>
+                  </a:lnRef>
+                  <a:fillRef idx="1">
+                    <a:schemeClr val="accent1"/>
+                  </a:fillRef>
+                  <a:effectRef idx="0">
+                    <a:schemeClr val="accent1"/>
+                  </a:effectRef>
+                  <a:fontRef idx="minor">
+                    <a:schemeClr val="lt1"/>
+                  </a:fontRef>
+                </p:style>
+                <p:txBody>
+                  <a:bodyPr rtlCol="0" anchor="ctr"/>
+                  <a:lstStyle/>
+                  <a:p>
+                    <a:pPr algn="ctr"/>
+                    <a:endParaRPr lang="en-US"/>
+                  </a:p>
+                </p:txBody>
+              </p:sp>
+            </p:grpSp>
+            <p:grpSp>
+              <p:nvGrpSpPr>
+                <p:cNvPr id="13" name="Group 12"/>
+                <p:cNvGrpSpPr/>
+                <p:nvPr/>
+              </p:nvGrpSpPr>
+              <p:grpSpPr>
+                <a:xfrm>
+                  <a:off x="4530486" y="4517443"/>
+                  <a:ext cx="989456" cy="132690"/>
+                  <a:chOff x="4282439" y="4592002"/>
+                  <a:chExt cx="1338536" cy="175260"/>
+                </a:xfrm>
+              </p:grpSpPr>
+              <p:sp>
+                <p:nvSpPr>
+                  <p:cNvPr id="20" name="Rectangle 19"/>
+                  <p:cNvSpPr/>
+                  <p:nvPr/>
+                </p:nvSpPr>
+                <p:spPr>
+                  <a:xfrm>
+                    <a:off x="4557651" y="4592002"/>
+                    <a:ext cx="1063324" cy="175260"/>
+                  </a:xfrm>
+                  <a:prstGeom prst="rect">
+                    <a:avLst/>
+                  </a:prstGeom>
+                  <a:solidFill>
+                    <a:schemeClr val="bg1">
+                      <a:lumMod val="85000"/>
+                    </a:schemeClr>
+                  </a:solidFill>
+                  <a:ln>
+                    <a:noFill/>
+                  </a:ln>
+                </p:spPr>
+                <p:style>
+                  <a:lnRef idx="2">
+                    <a:schemeClr val="accent1">
+                      <a:shade val="50000"/>
+                    </a:schemeClr>
+                  </a:lnRef>
+                  <a:fillRef idx="1">
+                    <a:schemeClr val="accent1"/>
+                  </a:fillRef>
+                  <a:effectRef idx="0">
+                    <a:schemeClr val="accent1"/>
+                  </a:effectRef>
+                  <a:fontRef idx="minor">
+                    <a:schemeClr val="lt1"/>
+                  </a:fontRef>
+                </p:style>
+                <p:txBody>
+                  <a:bodyPr rtlCol="0" anchor="ctr"/>
+                  <a:lstStyle/>
+                  <a:p>
+                    <a:pPr algn="ctr"/>
+                    <a:endParaRPr lang="en-US"/>
+                  </a:p>
+                </p:txBody>
+              </p:sp>
+              <p:sp>
+                <p:nvSpPr>
+                  <p:cNvPr id="21" name="Oval 20"/>
+                  <p:cNvSpPr/>
+                  <p:nvPr/>
+                </p:nvSpPr>
+                <p:spPr>
+                  <a:xfrm>
+                    <a:off x="4282439" y="4592002"/>
+                    <a:ext cx="185550" cy="175260"/>
+                  </a:xfrm>
+                  <a:prstGeom prst="ellipse">
+                    <a:avLst/>
+                  </a:prstGeom>
+                  <a:solidFill>
+                    <a:srgbClr val="78B946"/>
+                  </a:solidFill>
+                  <a:ln>
+                    <a:noFill/>
+                  </a:ln>
+                </p:spPr>
+                <p:style>
+                  <a:lnRef idx="2">
+                    <a:schemeClr val="accent1">
+                      <a:shade val="50000"/>
+                    </a:schemeClr>
+                  </a:lnRef>
+                  <a:fillRef idx="1">
+                    <a:schemeClr val="accent1"/>
+                  </a:fillRef>
+                  <a:effectRef idx="0">
+                    <a:schemeClr val="accent1"/>
+                  </a:effectRef>
+                  <a:fontRef idx="minor">
+                    <a:schemeClr val="lt1"/>
+                  </a:fontRef>
+                </p:style>
+                <p:txBody>
+                  <a:bodyPr rtlCol="0" anchor="ctr"/>
+                  <a:lstStyle/>
+                  <a:p>
+                    <a:pPr algn="ctr"/>
+                    <a:endParaRPr lang="en-US"/>
+                  </a:p>
+                </p:txBody>
+              </p:sp>
+            </p:grpSp>
+            <p:grpSp>
+              <p:nvGrpSpPr>
+                <p:cNvPr id="14" name="Group 13"/>
+                <p:cNvGrpSpPr/>
+                <p:nvPr/>
+              </p:nvGrpSpPr>
+              <p:grpSpPr>
+                <a:xfrm>
+                  <a:off x="3619489" y="4308222"/>
+                  <a:ext cx="814126" cy="132690"/>
+                  <a:chOff x="3619489" y="4290757"/>
+                  <a:chExt cx="814126" cy="132690"/>
+                </a:xfrm>
+              </p:grpSpPr>
+              <p:sp>
+                <p:nvSpPr>
+                  <p:cNvPr id="18" name="Rectangle 17"/>
+                  <p:cNvSpPr/>
+                  <p:nvPr/>
+                </p:nvSpPr>
+                <p:spPr>
+                  <a:xfrm>
+                    <a:off x="3831639" y="4290757"/>
+                    <a:ext cx="601976" cy="132690"/>
+                  </a:xfrm>
+                  <a:prstGeom prst="rect">
+                    <a:avLst/>
+                  </a:prstGeom>
+                  <a:solidFill>
+                    <a:schemeClr val="bg1">
+                      <a:lumMod val="85000"/>
+                    </a:schemeClr>
+                  </a:solidFill>
+                  <a:ln>
+                    <a:noFill/>
+                  </a:ln>
+                </p:spPr>
+                <p:style>
+                  <a:lnRef idx="2">
+                    <a:schemeClr val="accent1">
+                      <a:shade val="50000"/>
+                    </a:schemeClr>
+                  </a:lnRef>
+                  <a:fillRef idx="1">
+                    <a:schemeClr val="accent1"/>
+                  </a:fillRef>
+                  <a:effectRef idx="0">
+                    <a:schemeClr val="accent1"/>
+                  </a:effectRef>
+                  <a:fontRef idx="minor">
+                    <a:schemeClr val="lt1"/>
+                  </a:fontRef>
+                </p:style>
+                <p:txBody>
+                  <a:bodyPr rtlCol="0" anchor="ctr"/>
+                  <a:lstStyle/>
+                  <a:p>
+                    <a:pPr algn="ctr"/>
+                    <a:endParaRPr lang="en-US"/>
+                  </a:p>
+                </p:txBody>
+              </p:sp>
+              <p:sp>
+                <p:nvSpPr>
+                  <p:cNvPr id="19" name="Rectangle 18"/>
+                  <p:cNvSpPr/>
+                  <p:nvPr/>
+                </p:nvSpPr>
+                <p:spPr>
+                  <a:xfrm>
+                    <a:off x="3619489" y="4290757"/>
+                    <a:ext cx="132850" cy="132690"/>
+                  </a:xfrm>
+                  <a:prstGeom prst="rect">
+                    <a:avLst/>
+                  </a:prstGeom>
+                  <a:solidFill>
+                    <a:schemeClr val="bg1">
+                      <a:lumMod val="65000"/>
+                    </a:schemeClr>
+                  </a:solidFill>
+                  <a:ln>
+                    <a:noFill/>
+                  </a:ln>
+                </p:spPr>
+                <p:style>
+                  <a:lnRef idx="2">
+                    <a:schemeClr val="accent1">
+                      <a:shade val="50000"/>
+                    </a:schemeClr>
+                  </a:lnRef>
+                  <a:fillRef idx="1">
+                    <a:schemeClr val="accent1"/>
+                  </a:fillRef>
+                  <a:effectRef idx="0">
+                    <a:schemeClr val="accent1"/>
+                  </a:effectRef>
+                  <a:fontRef idx="minor">
+                    <a:schemeClr val="lt1"/>
+                  </a:fontRef>
+                </p:style>
+                <p:txBody>
+                  <a:bodyPr rtlCol="0" anchor="ctr"/>
+                  <a:lstStyle/>
+                  <a:p>
+                    <a:pPr algn="ctr"/>
+                    <a:endParaRPr lang="en-US"/>
+                  </a:p>
+                </p:txBody>
+              </p:sp>
+            </p:grpSp>
+            <p:sp>
+              <p:nvSpPr>
+                <p:cNvPr id="15" name="Rectangle 14"/>
+                <p:cNvSpPr/>
+                <p:nvPr/>
+              </p:nvSpPr>
+              <p:spPr>
+                <a:xfrm>
+                  <a:off x="3619488" y="4650133"/>
+                  <a:ext cx="814126" cy="137160"/>
+                </a:xfrm>
+                <a:prstGeom prst="rect">
+                  <a:avLst/>
+                </a:prstGeom>
+                <a:solidFill>
+                  <a:schemeClr val="bg1">
+                    <a:lumMod val="95000"/>
+                  </a:schemeClr>
+                </a:solidFill>
+                <a:ln>
+                  <a:noFill/>
+                </a:ln>
+              </p:spPr>
+              <p:style>
+                <a:lnRef idx="2">
+                  <a:schemeClr val="accent1">
+                    <a:shade val="50000"/>
+                  </a:schemeClr>
+                </a:lnRef>
+                <a:fillRef idx="1">
+                  <a:schemeClr val="accent1"/>
+                </a:fillRef>
+                <a:effectRef idx="0">
+                  <a:schemeClr val="accent1"/>
+                </a:effectRef>
+                <a:fontRef idx="minor">
+                  <a:schemeClr val="lt1"/>
+                </a:fontRef>
+              </p:style>
+              <p:txBody>
+                <a:bodyPr rtlCol="0" anchor="ctr"/>
+                <a:lstStyle/>
+                <a:p>
+                  <a:pPr algn="ctr"/>
+                  <a:endParaRPr lang="en-US"/>
+                </a:p>
+              </p:txBody>
+            </p:sp>
+            <p:sp>
+              <p:nvSpPr>
+                <p:cNvPr id="16" name="Rectangle 15"/>
+                <p:cNvSpPr/>
+                <p:nvPr/>
+              </p:nvSpPr>
+              <p:spPr>
+                <a:xfrm>
+                  <a:off x="3619488" y="4517443"/>
+                  <a:ext cx="814126" cy="132690"/>
+                </a:xfrm>
+                <a:prstGeom prst="rect">
+                  <a:avLst/>
+                </a:prstGeom>
+                <a:solidFill>
+                  <a:schemeClr val="bg1">
+                    <a:lumMod val="85000"/>
+                  </a:schemeClr>
+                </a:solidFill>
+                <a:ln>
+                  <a:noFill/>
+                </a:ln>
+              </p:spPr>
+              <p:style>
+                <a:lnRef idx="2">
+                  <a:schemeClr val="accent1">
+                    <a:shade val="50000"/>
+                  </a:schemeClr>
+                </a:lnRef>
+                <a:fillRef idx="1">
+                  <a:schemeClr val="accent1"/>
+                </a:fillRef>
+                <a:effectRef idx="0">
+                  <a:schemeClr val="accent1"/>
+                </a:effectRef>
+                <a:fontRef idx="minor">
+                  <a:schemeClr val="lt1"/>
+                </a:fontRef>
+              </p:style>
+              <p:txBody>
+                <a:bodyPr rtlCol="0" anchor="ctr"/>
+                <a:lstStyle/>
+                <a:p>
+                  <a:pPr algn="ctr"/>
+                  <a:endParaRPr lang="en-US"/>
+                </a:p>
+              </p:txBody>
+            </p:sp>
+            <p:sp>
+              <p:nvSpPr>
+                <p:cNvPr id="17" name="Isosceles Triangle 16"/>
+                <p:cNvSpPr/>
+                <p:nvPr/>
+              </p:nvSpPr>
+              <p:spPr>
+                <a:xfrm flipV="1">
+                  <a:off x="4309068" y="4550616"/>
+                  <a:ext cx="107941" cy="66345"/>
+                </a:xfrm>
+                <a:prstGeom prst="triangle">
+                  <a:avLst/>
+                </a:prstGeom>
+                <a:solidFill>
+                  <a:schemeClr val="bg1">
+                    <a:lumMod val="65000"/>
+                  </a:schemeClr>
+                </a:solidFill>
+                <a:ln>
+                  <a:noFill/>
+                </a:ln>
+              </p:spPr>
+              <p:style>
+                <a:lnRef idx="2">
+                  <a:schemeClr val="accent1">
+                    <a:shade val="50000"/>
+                  </a:schemeClr>
+                </a:lnRef>
+                <a:fillRef idx="1">
+                  <a:schemeClr val="accent1"/>
+                </a:fillRef>
+                <a:effectRef idx="0">
+                  <a:schemeClr val="accent1"/>
+                </a:effectRef>
+                <a:fontRef idx="minor">
+                  <a:schemeClr val="lt1"/>
+                </a:fontRef>
+              </p:style>
+              <p:txBody>
+                <a:bodyPr rtlCol="0" anchor="ctr"/>
+                <a:lstStyle/>
+                <a:p>
+                  <a:pPr algn="ctr"/>
+                  <a:endParaRPr lang="en-US"/>
+                </a:p>
+              </p:txBody>
+            </p:sp>
+          </p:grpSp>
+          <p:grpSp>
+            <p:nvGrpSpPr>
+              <p:cNvPr id="2" name="Group 1"/>
+              <p:cNvGrpSpPr/>
+              <p:nvPr/>
+            </p:nvGrpSpPr>
+            <p:grpSpPr>
+              <a:xfrm>
+                <a:off x="2599037" y="2052225"/>
+                <a:ext cx="1073408" cy="2587945"/>
+                <a:chOff x="4265767" y="1726390"/>
+                <a:chExt cx="591738" cy="1415801"/>
+              </a:xfrm>
+            </p:grpSpPr>
+            <p:sp>
+              <p:nvSpPr>
+                <p:cNvPr id="29" name="Snip Single Corner Rectangle 28"/>
+                <p:cNvSpPr/>
+                <p:nvPr/>
+              </p:nvSpPr>
+              <p:spPr>
+                <a:xfrm>
+                  <a:off x="4271358" y="1726390"/>
+                  <a:ext cx="586146" cy="1415801"/>
+                </a:xfrm>
+                <a:prstGeom prst="snip1Rect">
+                  <a:avLst>
+                    <a:gd name="adj" fmla="val 44791"/>
+                  </a:avLst>
+                </a:prstGeom>
+                <a:solidFill>
+                  <a:schemeClr val="bg1"/>
+                </a:solidFill>
+                <a:ln>
+                  <a:noFill/>
+                </a:ln>
+              </p:spPr>
+              <p:style>
+                <a:lnRef idx="2">
+                  <a:schemeClr val="accent1">
+                    <a:shade val="50000"/>
+                  </a:schemeClr>
+                </a:lnRef>
+                <a:fillRef idx="1">
+                  <a:schemeClr val="accent1"/>
+                </a:fillRef>
+                <a:effectRef idx="0">
+                  <a:schemeClr val="accent1"/>
+                </a:effectRef>
+                <a:fontRef idx="minor">
+                  <a:schemeClr val="lt1"/>
+                </a:fontRef>
+              </p:style>
+              <p:txBody>
+                <a:bodyPr rtlCol="0" anchor="ctr"/>
+                <a:lstStyle/>
+                <a:p>
+                  <a:pPr algn="ctr"/>
+                  <a:endParaRPr lang="en-US" sz="1000" dirty="0" smtClean="0">
+                    <a:solidFill>
+                      <a:schemeClr val="bg1">
+                        <a:lumMod val="85000"/>
+                      </a:schemeClr>
+                    </a:solidFill>
+                  </a:endParaRPr>
+                </a:p>
+                <a:p>
+                  <a:pPr algn="ctr"/>
+                  <a:endParaRPr lang="en-US" sz="1000" dirty="0">
+                    <a:solidFill>
+                      <a:schemeClr val="bg1">
+                        <a:lumMod val="85000"/>
+                      </a:schemeClr>
+                    </a:solidFill>
+                  </a:endParaRPr>
+                </a:p>
+                <a:p>
+                  <a:pPr algn="ctr"/>
+                  <a:endParaRPr lang="en-US" sz="1000" dirty="0" smtClean="0">
+                    <a:solidFill>
+                      <a:schemeClr val="bg1">
+                        <a:lumMod val="85000"/>
+                      </a:schemeClr>
+                    </a:solidFill>
+                  </a:endParaRPr>
+                </a:p>
+                <a:p>
+                  <a:pPr algn="ctr"/>
+                  <a:endParaRPr lang="en-US" sz="1000" dirty="0">
+                    <a:solidFill>
+                      <a:schemeClr val="bg1">
+                        <a:lumMod val="85000"/>
+                      </a:schemeClr>
+                    </a:solidFill>
+                  </a:endParaRPr>
+                </a:p>
+                <a:p>
+                  <a:pPr algn="ctr"/>
+                  <a:endParaRPr lang="en-US" sz="1000" dirty="0">
+                    <a:solidFill>
+                      <a:schemeClr val="bg1">
+                        <a:lumMod val="85000"/>
+                      </a:schemeClr>
+                    </a:solidFill>
+                  </a:endParaRPr>
+                </a:p>
+              </p:txBody>
+            </p:sp>
+            <p:sp>
+              <p:nvSpPr>
+                <p:cNvPr id="30" name="Right Triangle 29"/>
+                <p:cNvSpPr/>
+                <p:nvPr/>
+              </p:nvSpPr>
+              <p:spPr>
+                <a:xfrm>
+                  <a:off x="4596948" y="1726390"/>
+                  <a:ext cx="260557" cy="260557"/>
+                </a:xfrm>
+                <a:prstGeom prst="rtTriangle">
+                  <a:avLst/>
+                </a:prstGeom>
+                <a:solidFill>
+                  <a:schemeClr val="accent6">
+                    <a:lumMod val="60000"/>
+                    <a:lumOff val="40000"/>
+                  </a:schemeClr>
+                </a:solidFill>
+                <a:ln>
+                  <a:noFill/>
+                </a:ln>
+              </p:spPr>
+              <p:style>
+                <a:lnRef idx="2">
+                  <a:schemeClr val="accent1">
+                    <a:shade val="50000"/>
+                  </a:schemeClr>
+                </a:lnRef>
+                <a:fillRef idx="1">
+                  <a:schemeClr val="accent1"/>
+                </a:fillRef>
+                <a:effectRef idx="0">
+                  <a:schemeClr val="accent1"/>
+                </a:effectRef>
+                <a:fontRef idx="minor">
+                  <a:schemeClr val="lt1"/>
+                </a:fontRef>
+              </p:style>
+              <p:txBody>
+                <a:bodyPr rtlCol="0" anchor="ctr"/>
+                <a:lstStyle/>
+                <a:p>
+                  <a:pPr algn="ctr"/>
+                  <a:endParaRPr lang="en-US" sz="1000">
+                    <a:solidFill>
+                      <a:schemeClr val="bg1">
+                        <a:lumMod val="85000"/>
+                      </a:schemeClr>
+                    </a:solidFill>
+                  </a:endParaRPr>
+                </a:p>
+              </p:txBody>
+            </p:sp>
+            <p:grpSp>
+              <p:nvGrpSpPr>
+                <p:cNvPr id="68" name="Group 67"/>
+                <p:cNvGrpSpPr/>
+                <p:nvPr/>
+              </p:nvGrpSpPr>
+              <p:grpSpPr>
+                <a:xfrm>
+                  <a:off x="4265767" y="1989330"/>
+                  <a:ext cx="450784" cy="940021"/>
+                  <a:chOff x="4313740" y="1922244"/>
+                  <a:chExt cx="434473" cy="906007"/>
+                </a:xfrm>
+              </p:grpSpPr>
+              <p:sp>
+                <p:nvSpPr>
+                  <p:cNvPr id="33" name="Rectangle 32"/>
+                  <p:cNvSpPr/>
+                  <p:nvPr/>
+                </p:nvSpPr>
+                <p:spPr>
+                  <a:xfrm>
+                    <a:off x="4392279" y="1922244"/>
+                    <a:ext cx="151095" cy="71087"/>
+                  </a:xfrm>
+                  <a:prstGeom prst="rect">
+                    <a:avLst/>
+                  </a:prstGeom>
+                  <a:solidFill>
+                    <a:schemeClr val="bg1">
+                      <a:lumMod val="85000"/>
+                    </a:schemeClr>
+                  </a:solidFill>
+                  <a:ln>
+                    <a:noFill/>
+                  </a:ln>
+                </p:spPr>
+                <p:style>
+                  <a:lnRef idx="2">
+                    <a:schemeClr val="accent1">
+                      <a:shade val="50000"/>
+                    </a:schemeClr>
+                  </a:lnRef>
+                  <a:fillRef idx="1">
+                    <a:schemeClr val="accent1"/>
+                  </a:fillRef>
+                  <a:effectRef idx="0">
+                    <a:schemeClr val="accent1"/>
+                  </a:effectRef>
+                  <a:fontRef idx="minor">
+                    <a:schemeClr val="lt1"/>
+                  </a:fontRef>
+                </p:style>
+                <p:txBody>
+                  <a:bodyPr rtlCol="0" anchor="ctr"/>
+                  <a:lstStyle/>
+                  <a:p>
+                    <a:pPr algn="ctr"/>
+                    <a:endParaRPr lang="en-US" sz="600" b="1">
+                      <a:solidFill>
+                        <a:schemeClr val="bg1">
+                          <a:lumMod val="85000"/>
+                        </a:schemeClr>
+                      </a:solidFill>
+                    </a:endParaRPr>
+                  </a:p>
+                </p:txBody>
+              </p:sp>
+              <p:sp>
+                <p:nvSpPr>
+                  <p:cNvPr id="46" name="Rectangle 45"/>
+                  <p:cNvSpPr/>
+                  <p:nvPr/>
+                </p:nvSpPr>
+                <p:spPr>
+                  <a:xfrm>
+                    <a:off x="4313740" y="2201651"/>
+                    <a:ext cx="82463" cy="71088"/>
+                  </a:xfrm>
+                  <a:prstGeom prst="rect">
+                    <a:avLst/>
+                  </a:prstGeom>
+                  <a:solidFill>
+                    <a:schemeClr val="bg1">
+                      <a:lumMod val="85000"/>
+                    </a:schemeClr>
+                  </a:solidFill>
+                  <a:ln>
+                    <a:noFill/>
+                  </a:ln>
+                </p:spPr>
+                <p:style>
+                  <a:lnRef idx="2">
+                    <a:schemeClr val="accent1">
+                      <a:shade val="50000"/>
+                    </a:schemeClr>
+                  </a:lnRef>
+                  <a:fillRef idx="1">
+                    <a:schemeClr val="accent1"/>
+                  </a:fillRef>
+                  <a:effectRef idx="0">
+                    <a:schemeClr val="accent1"/>
+                  </a:effectRef>
+                  <a:fontRef idx="minor">
+                    <a:schemeClr val="lt1"/>
+                  </a:fontRef>
+                </p:style>
+                <p:txBody>
+                  <a:bodyPr rtlCol="0" anchor="ctr"/>
+                  <a:lstStyle/>
+                  <a:p>
+                    <a:pPr algn="ctr"/>
+                    <a:endParaRPr lang="en-US" sz="600" b="1">
+                      <a:solidFill>
+                        <a:schemeClr val="bg1">
+                          <a:lumMod val="85000"/>
+                        </a:schemeClr>
+                      </a:solidFill>
+                    </a:endParaRPr>
+                  </a:p>
+                </p:txBody>
+              </p:sp>
+              <p:sp>
+                <p:nvSpPr>
+                  <p:cNvPr id="60" name="Rectangle 59"/>
+                  <p:cNvSpPr/>
+                  <p:nvPr/>
+                </p:nvSpPr>
+                <p:spPr>
+                  <a:xfrm>
+                    <a:off x="4319126" y="2481729"/>
+                    <a:ext cx="124287" cy="71088"/>
+                  </a:xfrm>
+                  <a:prstGeom prst="rect">
+                    <a:avLst/>
+                  </a:prstGeom>
+                  <a:solidFill>
+                    <a:schemeClr val="bg1">
+                      <a:lumMod val="85000"/>
+                    </a:schemeClr>
+                  </a:solidFill>
+                  <a:ln>
+                    <a:noFill/>
+                  </a:ln>
+                </p:spPr>
+                <p:style>
+                  <a:lnRef idx="2">
+                    <a:schemeClr val="accent1">
+                      <a:shade val="50000"/>
+                    </a:schemeClr>
+                  </a:lnRef>
+                  <a:fillRef idx="1">
+                    <a:schemeClr val="accent1"/>
+                  </a:fillRef>
+                  <a:effectRef idx="0">
+                    <a:schemeClr val="accent1"/>
+                  </a:effectRef>
+                  <a:fontRef idx="minor">
+                    <a:schemeClr val="lt1"/>
+                  </a:fontRef>
+                </p:style>
+                <p:txBody>
+                  <a:bodyPr rtlCol="0" anchor="ctr"/>
+                  <a:lstStyle/>
+                  <a:p>
+                    <a:pPr algn="ctr"/>
+                    <a:endParaRPr lang="en-US" sz="600" b="1">
+                      <a:solidFill>
+                        <a:schemeClr val="bg1">
+                          <a:lumMod val="85000"/>
+                        </a:schemeClr>
+                      </a:solidFill>
+                    </a:endParaRPr>
+                  </a:p>
+                </p:txBody>
+              </p:sp>
+              <p:sp>
+                <p:nvSpPr>
+                  <p:cNvPr id="61" name="Rectangle 60"/>
+                  <p:cNvSpPr/>
+                  <p:nvPr/>
+                </p:nvSpPr>
+                <p:spPr>
+                  <a:xfrm>
+                    <a:off x="4319126" y="2341681"/>
+                    <a:ext cx="346411" cy="71087"/>
+                  </a:xfrm>
+                  <a:prstGeom prst="rect">
+                    <a:avLst/>
+                  </a:prstGeom>
+                  <a:solidFill>
+                    <a:schemeClr val="bg1">
+                      <a:lumMod val="85000"/>
+                    </a:schemeClr>
+                  </a:solidFill>
+                  <a:ln>
+                    <a:noFill/>
+                  </a:ln>
+                </p:spPr>
+                <p:style>
+                  <a:lnRef idx="2">
+                    <a:schemeClr val="accent1">
+                      <a:shade val="50000"/>
+                    </a:schemeClr>
+                  </a:lnRef>
+                  <a:fillRef idx="1">
+                    <a:schemeClr val="accent1"/>
+                  </a:fillRef>
+                  <a:effectRef idx="0">
+                    <a:schemeClr val="accent1"/>
+                  </a:effectRef>
+                  <a:fontRef idx="minor">
+                    <a:schemeClr val="lt1"/>
+                  </a:fontRef>
+                </p:style>
+                <p:txBody>
+                  <a:bodyPr rtlCol="0" anchor="ctr"/>
+                  <a:lstStyle/>
+                  <a:p>
+                    <a:pPr algn="ctr"/>
+                    <a:endParaRPr lang="en-US" sz="600" b="1">
+                      <a:solidFill>
+                        <a:schemeClr val="bg1">
+                          <a:lumMod val="85000"/>
+                        </a:schemeClr>
+                      </a:solidFill>
+                    </a:endParaRPr>
+                  </a:p>
+                </p:txBody>
+              </p:sp>
+              <p:sp>
+                <p:nvSpPr>
+                  <p:cNvPr id="63" name="Rectangle 62"/>
+                  <p:cNvSpPr/>
+                  <p:nvPr/>
+                </p:nvSpPr>
+                <p:spPr>
+                  <a:xfrm>
+                    <a:off x="4319126" y="2617135"/>
+                    <a:ext cx="27496" cy="71088"/>
+                  </a:xfrm>
+                  <a:prstGeom prst="rect">
+                    <a:avLst/>
+                  </a:prstGeom>
+                  <a:solidFill>
+                    <a:schemeClr val="bg1">
+                      <a:lumMod val="85000"/>
+                    </a:schemeClr>
+                  </a:solidFill>
+                  <a:ln>
+                    <a:noFill/>
+                  </a:ln>
+                </p:spPr>
+                <p:style>
+                  <a:lnRef idx="2">
+                    <a:schemeClr val="accent1">
+                      <a:shade val="50000"/>
+                    </a:schemeClr>
+                  </a:lnRef>
+                  <a:fillRef idx="1">
+                    <a:schemeClr val="accent1"/>
+                  </a:fillRef>
+                  <a:effectRef idx="0">
+                    <a:schemeClr val="accent1"/>
+                  </a:effectRef>
+                  <a:fontRef idx="minor">
+                    <a:schemeClr val="lt1"/>
+                  </a:fontRef>
+                </p:style>
+                <p:txBody>
+                  <a:bodyPr rtlCol="0" anchor="ctr"/>
+                  <a:lstStyle/>
+                  <a:p>
+                    <a:pPr algn="ctr"/>
+                    <a:endParaRPr lang="en-US" sz="600" b="1">
+                      <a:solidFill>
+                        <a:schemeClr val="bg1">
+                          <a:lumMod val="85000"/>
+                        </a:schemeClr>
+                      </a:solidFill>
+                    </a:endParaRPr>
+                  </a:p>
+                </p:txBody>
+              </p:sp>
+              <p:sp>
+                <p:nvSpPr>
+                  <p:cNvPr id="65" name="Rectangle 64"/>
+                  <p:cNvSpPr/>
+                  <p:nvPr/>
+                </p:nvSpPr>
+                <p:spPr>
+                  <a:xfrm>
+                    <a:off x="4319126" y="2757164"/>
+                    <a:ext cx="429087" cy="71087"/>
+                  </a:xfrm>
+                  <a:prstGeom prst="rect">
+                    <a:avLst/>
+                  </a:prstGeom>
+                  <a:solidFill>
+                    <a:schemeClr val="bg1">
+                      <a:lumMod val="85000"/>
+                    </a:schemeClr>
+                  </a:solidFill>
+                  <a:ln>
+                    <a:noFill/>
+                  </a:ln>
+                </p:spPr>
+                <p:style>
+                  <a:lnRef idx="2">
+                    <a:schemeClr val="accent1">
+                      <a:shade val="50000"/>
+                    </a:schemeClr>
+                  </a:lnRef>
+                  <a:fillRef idx="1">
+                    <a:schemeClr val="accent1"/>
+                  </a:fillRef>
+                  <a:effectRef idx="0">
+                    <a:schemeClr val="accent1"/>
+                  </a:effectRef>
+                  <a:fontRef idx="minor">
+                    <a:schemeClr val="lt1"/>
+                  </a:fontRef>
+                </p:style>
+                <p:txBody>
+                  <a:bodyPr rtlCol="0" anchor="ctr"/>
+                  <a:lstStyle/>
+                  <a:p>
+                    <a:pPr algn="ctr"/>
+                    <a:endParaRPr lang="en-US" sz="600" b="1">
+                      <a:solidFill>
+                        <a:schemeClr val="bg1">
+                          <a:lumMod val="85000"/>
+                        </a:schemeClr>
+                      </a:solidFill>
+                    </a:endParaRPr>
+                  </a:p>
+                </p:txBody>
+              </p:sp>
+            </p:grpSp>
+          </p:grpSp>
+        </p:grpSp>
+        <p:cxnSp>
+          <p:nvCxnSpPr>
+            <p:cNvPr id="31" name="Straight Connector 30"/>
+            <p:cNvCxnSpPr/>
+            <p:nvPr/>
+          </p:nvCxnSpPr>
+          <p:spPr>
+            <a:xfrm>
+              <a:off x="2576592" y="2052227"/>
+              <a:ext cx="0" cy="2587945"/>
+            </a:xfrm>
+            <a:prstGeom prst="line">
+              <a:avLst/>
+            </a:prstGeom>
+            <a:ln w="127000">
+              <a:solidFill>
+                <a:schemeClr val="tx1"/>
+              </a:solidFill>
+              <a:prstDash val="sysDot"/>
+            </a:ln>
+          </p:spPr>
+          <p:style>
+            <a:lnRef idx="1">
+              <a:schemeClr val="accent1"/>
+            </a:lnRef>
+            <a:fillRef idx="0">
+              <a:schemeClr val="accent1"/>
+            </a:fillRef>
+            <a:effectRef idx="0">
+              <a:schemeClr val="accent1"/>
+            </a:effectRef>
+            <a:fontRef idx="minor">
+              <a:schemeClr val="tx1"/>
+            </a:fontRef>
+          </p:style>
+        </p:cxnSp>
+        <p:grpSp>
+          <p:nvGrpSpPr>
+            <p:cNvPr id="38" name="Group 37"/>
+            <p:cNvGrpSpPr/>
+            <p:nvPr/>
+          </p:nvGrpSpPr>
+          <p:grpSpPr>
+            <a:xfrm rot="18900000">
+              <a:off x="1849255" y="2618860"/>
+              <a:ext cx="1454674" cy="1454675"/>
+              <a:chOff x="5072061" y="259843"/>
+              <a:chExt cx="1285876" cy="1285877"/>
+            </a:xfrm>
+            <a:solidFill>
+              <a:srgbClr val="CF3939"/>
+            </a:solidFill>
+          </p:grpSpPr>
+          <p:sp>
+            <p:nvSpPr>
+              <p:cNvPr id="56" name="Oval 55"/>
+              <p:cNvSpPr/>
+              <p:nvPr/>
+            </p:nvSpPr>
+            <p:spPr>
+              <a:xfrm>
+                <a:off x="5500686" y="688469"/>
+                <a:ext cx="857251" cy="857251"/>
+              </a:xfrm>
+              <a:prstGeom prst="ellipse">
+                <a:avLst/>
+              </a:prstGeom>
+              <a:grpFill/>
+              <a:ln>
+                <a:noFill/>
+              </a:ln>
+            </p:spPr>
+            <p:style>
+              <a:lnRef idx="2">
+                <a:schemeClr val="accent1">
+                  <a:shade val="50000"/>
+                </a:schemeClr>
+              </a:lnRef>
+              <a:fillRef idx="1">
+                <a:schemeClr val="accent1"/>
+              </a:fillRef>
+              <a:effectRef idx="0">
+                <a:schemeClr val="accent1"/>
+              </a:effectRef>
+              <a:fontRef idx="minor">
+                <a:schemeClr val="lt1"/>
+              </a:fontRef>
+            </p:style>
+            <p:txBody>
+              <a:bodyPr rtlCol="0" anchor="ctr"/>
+              <a:lstStyle/>
+              <a:p>
+                <a:pPr algn="ctr"/>
+                <a:endParaRPr lang="en-US"/>
+              </a:p>
+            </p:txBody>
+          </p:sp>
+          <p:sp>
+            <p:nvSpPr>
+              <p:cNvPr id="37" name="Rectangle 36"/>
+              <p:cNvSpPr/>
+              <p:nvPr/>
+            </p:nvSpPr>
+            <p:spPr>
+              <a:xfrm>
+                <a:off x="5072061" y="688469"/>
+                <a:ext cx="857250" cy="857250"/>
+              </a:xfrm>
+              <a:prstGeom prst="rect">
+                <a:avLst/>
+              </a:prstGeom>
+              <a:grpFill/>
+              <a:ln>
+                <a:noFill/>
+              </a:ln>
+            </p:spPr>
+            <p:style>
+              <a:lnRef idx="2">
+                <a:schemeClr val="accent1">
+                  <a:shade val="50000"/>
+                </a:schemeClr>
+              </a:lnRef>
+              <a:fillRef idx="1">
+                <a:schemeClr val="accent1"/>
+              </a:fillRef>
+              <a:effectRef idx="0">
+                <a:schemeClr val="accent1"/>
+              </a:effectRef>
+              <a:fontRef idx="minor">
+                <a:schemeClr val="lt1"/>
+              </a:fontRef>
+            </p:style>
+            <p:txBody>
+              <a:bodyPr rtlCol="0" anchor="ctr"/>
+              <a:lstStyle/>
+              <a:p>
+                <a:pPr algn="ctr"/>
+                <a:endParaRPr lang="en-US"/>
+              </a:p>
+            </p:txBody>
+          </p:sp>
+          <p:sp>
+            <p:nvSpPr>
+              <p:cNvPr id="59" name="Oval 58"/>
+              <p:cNvSpPr/>
+              <p:nvPr/>
+            </p:nvSpPr>
+            <p:spPr>
+              <a:xfrm>
+                <a:off x="5072061" y="259843"/>
+                <a:ext cx="857251" cy="857251"/>
+              </a:xfrm>
+              <a:prstGeom prst="ellipse">
+                <a:avLst/>
+              </a:prstGeom>
+              <a:grpFill/>
+              <a:ln>
+                <a:noFill/>
+              </a:ln>
+            </p:spPr>
+            <p:style>
+              <a:lnRef idx="2">
+                <a:schemeClr val="accent1">
+                  <a:shade val="50000"/>
+                </a:schemeClr>
+              </a:lnRef>
+              <a:fillRef idx="1">
+                <a:schemeClr val="accent1"/>
+              </a:fillRef>
+              <a:effectRef idx="0">
+                <a:schemeClr val="accent1"/>
+              </a:effectRef>
+              <a:fontRef idx="minor">
+                <a:schemeClr val="lt1"/>
+              </a:fontRef>
+            </p:style>
+            <p:txBody>
+              <a:bodyPr rtlCol="0" anchor="ctr"/>
+              <a:lstStyle/>
+              <a:p>
+                <a:pPr algn="ctr"/>
+                <a:endParaRPr lang="en-US"/>
+              </a:p>
+            </p:txBody>
+          </p:sp>
+        </p:grpSp>
+      </p:grpSp>
+    </p:spTree>
+    <p:extLst>
+      <p:ext uri="{BB962C8B-B14F-4D97-AF65-F5344CB8AC3E}">
+        <p14:creationId xmlns:p14="http://schemas.microsoft.com/office/powerpoint/2010/main" val="3563678267"/>
+      </p:ext>
+    </p:extLst>
+  </p:cSld>
+  <p:clrMapOvr>
+    <a:masterClrMapping/>
+  </p:clrMapOvr>
+  <p:timing>
+    <p:tnLst>
+      <p:par>
+        <p:cTn id="1" dur="indefinite" restart="never" nodeType="tmRoot"/>
+      </p:par>
+    </p:tnLst>
+  </p:timing>
+</p:sld>
+</file>
+
 <file path=ppt/theme/theme1.xml><?xml version="1.0" encoding="utf-8"?>
 <a:theme xmlns:a="http://schemas.openxmlformats.org/drawingml/2006/main" name="Office Theme">
   <a:themeElements>

</xml_diff>

<commit_message>
Drag-and-drop implementation * Minor modifications: icon & GUI
</commit_message>
<xml_diff>
--- a/images/icons.pptx
+++ b/images/icons.pptx
@@ -7456,16 +7456,16 @@
       </p:grpSpPr>
       <p:grpSp>
         <p:nvGrpSpPr>
-          <p:cNvPr id="43" name="Group 42"/>
+          <p:cNvPr id="3" name="Group 2"/>
           <p:cNvGrpSpPr/>
           <p:nvPr/>
         </p:nvGrpSpPr>
         <p:grpSpPr>
           <a:xfrm>
-            <a:off x="243719" y="-2371187"/>
-            <a:ext cx="8713908" cy="8713908"/>
-            <a:chOff x="544392" y="1313999"/>
-            <a:chExt cx="4064401" cy="4064401"/>
+            <a:off x="3129793" y="1554482"/>
+            <a:ext cx="1554480" cy="1554480"/>
+            <a:chOff x="3129793" y="1554482"/>
+            <a:chExt cx="1554480" cy="1554480"/>
           </a:xfrm>
         </p:grpSpPr>
         <p:sp>
@@ -7476,8 +7476,8 @@
           </p:nvSpPr>
           <p:spPr>
             <a:xfrm>
-              <a:off x="544392" y="1313999"/>
-              <a:ext cx="4064401" cy="4064401"/>
+              <a:off x="3129793" y="1554482"/>
+              <a:ext cx="1554480" cy="1554480"/>
             </a:xfrm>
             <a:prstGeom prst="ellipse">
               <a:avLst/>
@@ -7524,8 +7524,8 @@
           </p:nvGrpSpPr>
           <p:grpSpPr>
             <a:xfrm>
-              <a:off x="1480739" y="2052225"/>
-              <a:ext cx="2191706" cy="2587947"/>
+              <a:off x="3487910" y="1836826"/>
+              <a:ext cx="838245" cy="989792"/>
               <a:chOff x="1480739" y="2052225"/>
               <a:chExt cx="2191706" cy="2587947"/>
             </a:xfrm>
@@ -8929,13 +8929,13 @@
           </p:nvCxnSpPr>
           <p:spPr>
             <a:xfrm>
-              <a:off x="2576592" y="2052227"/>
-              <a:ext cx="0" cy="2587945"/>
+              <a:off x="3907033" y="1836826"/>
+              <a:ext cx="0" cy="989791"/>
             </a:xfrm>
             <a:prstGeom prst="line">
               <a:avLst/>
             </a:prstGeom>
-            <a:ln w="127000">
+            <a:ln w="92075">
               <a:solidFill>
                 <a:schemeClr val="tx1"/>
               </a:solidFill>
@@ -8965,10 +8965,10 @@
           </p:nvGrpSpPr>
           <p:grpSpPr>
             <a:xfrm rot="18900000">
-              <a:off x="1849255" y="2618860"/>
-              <a:ext cx="1454674" cy="1454675"/>
-              <a:chOff x="5072061" y="259843"/>
-              <a:chExt cx="1285876" cy="1285877"/>
+              <a:off x="3628855" y="2053543"/>
+              <a:ext cx="556357" cy="556358"/>
+              <a:chOff x="4900819" y="431088"/>
+              <a:chExt cx="1285873" cy="1285877"/>
             </a:xfrm>
             <a:solidFill>
               <a:srgbClr val="CF3939"/>
@@ -8982,8 +8982,8 @@
             </p:nvSpPr>
             <p:spPr>
               <a:xfrm>
-                <a:off x="5500686" y="688469"/>
-                <a:ext cx="857251" cy="857251"/>
+                <a:off x="5329442" y="859711"/>
+                <a:ext cx="857250" cy="857252"/>
               </a:xfrm>
               <a:prstGeom prst="ellipse">
                 <a:avLst/>
@@ -9026,8 +9026,8 @@
             </p:nvSpPr>
             <p:spPr>
               <a:xfrm>
-                <a:off x="5072061" y="688469"/>
-                <a:ext cx="857250" cy="857250"/>
+                <a:off x="4900819" y="859713"/>
+                <a:ext cx="857247" cy="857252"/>
               </a:xfrm>
               <a:prstGeom prst="rect">
                 <a:avLst/>
@@ -9070,8 +9070,8 @@
             </p:nvSpPr>
             <p:spPr>
               <a:xfrm>
-                <a:off x="5072061" y="259843"/>
-                <a:ext cx="857251" cy="857251"/>
+                <a:off x="4900819" y="431088"/>
+                <a:ext cx="857249" cy="857253"/>
               </a:xfrm>
               <a:prstGeom prst="ellipse">
                 <a:avLst/>

</xml_diff>

<commit_message>
OSX compatibility tested, fixes and refactoring (LLVM)
</commit_message>
<xml_diff>
--- a/images/icons.pptx
+++ b/images/icons.pptx
@@ -5,12 +5,13 @@
     <p:sldMasterId id="2147483648" r:id="rId1"/>
   </p:sldMasterIdLst>
   <p:notesMasterIdLst>
-    <p:notesMasterId r:id="rId5"/>
+    <p:notesMasterId r:id="rId6"/>
   </p:notesMasterIdLst>
   <p:sldIdLst>
     <p:sldId id="260" r:id="rId2"/>
     <p:sldId id="261" r:id="rId3"/>
     <p:sldId id="262" r:id="rId4"/>
+    <p:sldId id="263" r:id="rId5"/>
   </p:sldIdLst>
   <p:sldSz cx="9144000" cy="6858000" type="screen4x3"/>
   <p:notesSz cx="6858000" cy="9144000"/>
@@ -460,6 +461,90 @@
     </a:lvl9pPr>
   </p:notesStyle>
 </p:notesMaster>
+</file>
+
+<file path=ppt/notesSlides/notesSlide1.xml><?xml version="1.0" encoding="utf-8"?>
+<p:notes xmlns:a="http://schemas.openxmlformats.org/drawingml/2006/main" xmlns:r="http://schemas.openxmlformats.org/officeDocument/2006/relationships" xmlns:p="http://schemas.openxmlformats.org/presentationml/2006/main">
+  <p:cSld>
+    <p:spTree>
+      <p:nvGrpSpPr>
+        <p:cNvPr id="1" name=""/>
+        <p:cNvGrpSpPr/>
+        <p:nvPr/>
+      </p:nvGrpSpPr>
+      <p:grpSpPr>
+        <a:xfrm>
+          <a:off x="0" y="0"/>
+          <a:ext cx="0" cy="0"/>
+          <a:chOff x="0" y="0"/>
+          <a:chExt cx="0" cy="0"/>
+        </a:xfrm>
+      </p:grpSpPr>
+      <p:sp>
+        <p:nvSpPr>
+          <p:cNvPr id="2" name="Slide Image Placeholder 1"/>
+          <p:cNvSpPr>
+            <a:spLocks noGrp="1" noRot="1" noChangeAspect="1"/>
+          </p:cNvSpPr>
+          <p:nvPr>
+            <p:ph type="sldImg"/>
+          </p:nvPr>
+        </p:nvSpPr>
+        <p:spPr/>
+      </p:sp>
+      <p:sp>
+        <p:nvSpPr>
+          <p:cNvPr id="3" name="Notes Placeholder 2"/>
+          <p:cNvSpPr>
+            <a:spLocks noGrp="1"/>
+          </p:cNvSpPr>
+          <p:nvPr>
+            <p:ph type="body" idx="1"/>
+          </p:nvPr>
+        </p:nvSpPr>
+        <p:spPr/>
+        <p:txBody>
+          <a:bodyPr/>
+          <a:lstStyle/>
+          <a:p>
+            <a:endParaRPr lang="en-US" dirty="0"/>
+          </a:p>
+        </p:txBody>
+      </p:sp>
+      <p:sp>
+        <p:nvSpPr>
+          <p:cNvPr id="4" name="Slide Number Placeholder 3"/>
+          <p:cNvSpPr>
+            <a:spLocks noGrp="1"/>
+          </p:cNvSpPr>
+          <p:nvPr>
+            <p:ph type="sldNum" sz="quarter" idx="10"/>
+          </p:nvPr>
+        </p:nvSpPr>
+        <p:spPr/>
+        <p:txBody>
+          <a:bodyPr/>
+          <a:lstStyle/>
+          <a:p>
+            <a:fld id="{CD9C59E5-F056-4777-BD59-19AD03834E1F}" type="slidenum">
+              <a:rPr lang="en-US" smtClean="0"/>
+              <a:t>4</a:t>
+            </a:fld>
+            <a:endParaRPr lang="en-US"/>
+          </a:p>
+        </p:txBody>
+      </p:sp>
+    </p:spTree>
+    <p:extLst>
+      <p:ext uri="{BB962C8B-B14F-4D97-AF65-F5344CB8AC3E}">
+        <p14:creationId xmlns:p14="http://schemas.microsoft.com/office/powerpoint/2010/main" val="3449197863"/>
+      </p:ext>
+    </p:extLst>
+  </p:cSld>
+  <p:clrMapOvr>
+    <a:masterClrMapping/>
+  </p:clrMapOvr>
+</p:notes>
 </file>
 
 <file path=ppt/slideLayouts/slideLayout1.xml><?xml version="1.0" encoding="utf-8"?>
@@ -9128,6 +9213,946 @@
 </p:sld>
 </file>
 
+<file path=ppt/slides/slide4.xml><?xml version="1.0" encoding="utf-8"?>
+<p:sld xmlns:a="http://schemas.openxmlformats.org/drawingml/2006/main" xmlns:r="http://schemas.openxmlformats.org/officeDocument/2006/relationships" xmlns:p="http://schemas.openxmlformats.org/presentationml/2006/main">
+  <p:cSld>
+    <p:spTree>
+      <p:nvGrpSpPr>
+        <p:cNvPr id="1" name=""/>
+        <p:cNvGrpSpPr/>
+        <p:nvPr/>
+      </p:nvGrpSpPr>
+      <p:grpSpPr>
+        <a:xfrm>
+          <a:off x="0" y="0"/>
+          <a:ext cx="0" cy="0"/>
+          <a:chOff x="0" y="0"/>
+          <a:chExt cx="0" cy="0"/>
+        </a:xfrm>
+      </p:grpSpPr>
+      <p:sp>
+        <p:nvSpPr>
+          <p:cNvPr id="5" name="Oval 4"/>
+          <p:cNvSpPr/>
+          <p:nvPr/>
+        </p:nvSpPr>
+        <p:spPr>
+          <a:xfrm>
+            <a:off x="2545235" y="503460"/>
+            <a:ext cx="4064401" cy="4064401"/>
+          </a:xfrm>
+          <a:prstGeom prst="ellipse">
+            <a:avLst/>
+          </a:prstGeom>
+          <a:solidFill>
+            <a:schemeClr val="tx2">
+              <a:lumMod val="60000"/>
+              <a:lumOff val="40000"/>
+            </a:schemeClr>
+          </a:solidFill>
+          <a:ln>
+            <a:noFill/>
+          </a:ln>
+        </p:spPr>
+        <p:style>
+          <a:lnRef idx="2">
+            <a:schemeClr val="accent1">
+              <a:shade val="50000"/>
+            </a:schemeClr>
+          </a:lnRef>
+          <a:fillRef idx="1">
+            <a:schemeClr val="accent1"/>
+          </a:fillRef>
+          <a:effectRef idx="0">
+            <a:schemeClr val="accent1"/>
+          </a:effectRef>
+          <a:fontRef idx="minor">
+            <a:schemeClr val="lt1"/>
+          </a:fontRef>
+        </p:style>
+        <p:txBody>
+          <a:bodyPr rtlCol="0" anchor="ctr"/>
+          <a:lstStyle/>
+          <a:p>
+            <a:pPr algn="ctr"/>
+            <a:endParaRPr lang="en-US"/>
+          </a:p>
+        </p:txBody>
+      </p:sp>
+      <p:sp>
+        <p:nvSpPr>
+          <p:cNvPr id="11" name="Rectangle 10"/>
+          <p:cNvSpPr/>
+          <p:nvPr/>
+        </p:nvSpPr>
+        <p:spPr>
+          <a:xfrm>
+            <a:off x="3939724" y="1618112"/>
+            <a:ext cx="1271156" cy="2170845"/>
+          </a:xfrm>
+          <a:prstGeom prst="rect">
+            <a:avLst/>
+          </a:prstGeom>
+          <a:solidFill>
+            <a:srgbClr val="D7E5F5"/>
+          </a:solidFill>
+          <a:ln>
+            <a:noFill/>
+          </a:ln>
+        </p:spPr>
+        <p:style>
+          <a:lnRef idx="2">
+            <a:schemeClr val="accent1">
+              <a:shade val="50000"/>
+            </a:schemeClr>
+          </a:lnRef>
+          <a:fillRef idx="1">
+            <a:schemeClr val="accent1"/>
+          </a:fillRef>
+          <a:effectRef idx="0">
+            <a:schemeClr val="accent1"/>
+          </a:effectRef>
+          <a:fontRef idx="minor">
+            <a:schemeClr val="lt1"/>
+          </a:fontRef>
+        </p:style>
+        <p:txBody>
+          <a:bodyPr rtlCol="0" anchor="ctr"/>
+          <a:lstStyle/>
+          <a:p>
+            <a:pPr algn="ctr"/>
+            <a:endParaRPr lang="en-US"/>
+          </a:p>
+        </p:txBody>
+      </p:sp>
+      <p:grpSp>
+        <p:nvGrpSpPr>
+          <p:cNvPr id="52" name="Group 51"/>
+          <p:cNvGrpSpPr/>
+          <p:nvPr/>
+        </p:nvGrpSpPr>
+        <p:grpSpPr>
+          <a:xfrm>
+            <a:off x="5210878" y="1999466"/>
+            <a:ext cx="666353" cy="1408140"/>
+            <a:chOff x="5210872" y="1999466"/>
+            <a:chExt cx="666359" cy="1408140"/>
+          </a:xfrm>
+        </p:grpSpPr>
+        <p:sp>
+          <p:nvSpPr>
+            <p:cNvPr id="12" name="Round Same Side Corner Rectangle 11"/>
+            <p:cNvSpPr/>
+            <p:nvPr/>
+          </p:nvSpPr>
+          <p:spPr>
+            <a:xfrm rot="5400000">
+              <a:off x="4839985" y="2370359"/>
+              <a:ext cx="1408140" cy="666353"/>
+            </a:xfrm>
+            <a:prstGeom prst="round2SameRect">
+              <a:avLst>
+                <a:gd name="adj1" fmla="val 50000"/>
+                <a:gd name="adj2" fmla="val 0"/>
+              </a:avLst>
+            </a:prstGeom>
+            <a:solidFill>
+              <a:srgbClr val="D7E5F5"/>
+            </a:solidFill>
+            <a:ln>
+              <a:noFill/>
+            </a:ln>
+          </p:spPr>
+          <p:style>
+            <a:lnRef idx="2">
+              <a:schemeClr val="accent1">
+                <a:shade val="50000"/>
+              </a:schemeClr>
+            </a:lnRef>
+            <a:fillRef idx="1">
+              <a:schemeClr val="accent1"/>
+            </a:fillRef>
+            <a:effectRef idx="0">
+              <a:schemeClr val="accent1"/>
+            </a:effectRef>
+            <a:fontRef idx="minor">
+              <a:schemeClr val="lt1"/>
+            </a:fontRef>
+          </p:style>
+          <p:txBody>
+            <a:bodyPr rtlCol="0" anchor="ctr"/>
+            <a:lstStyle/>
+            <a:p>
+              <a:pPr algn="ctr"/>
+              <a:endParaRPr lang="en-US"/>
+            </a:p>
+          </p:txBody>
+        </p:sp>
+        <p:sp>
+          <p:nvSpPr>
+            <p:cNvPr id="29" name="Round Same Side Corner Rectangle 28"/>
+            <p:cNvSpPr/>
+            <p:nvPr/>
+          </p:nvSpPr>
+          <p:spPr>
+            <a:xfrm rot="5400000">
+              <a:off x="4953849" y="2472651"/>
+              <a:ext cx="975815" cy="461770"/>
+            </a:xfrm>
+            <a:prstGeom prst="round2SameRect">
+              <a:avLst>
+                <a:gd name="adj1" fmla="val 29078"/>
+                <a:gd name="adj2" fmla="val 0"/>
+              </a:avLst>
+            </a:prstGeom>
+            <a:solidFill>
+              <a:schemeClr val="tx2">
+                <a:lumMod val="60000"/>
+                <a:lumOff val="40000"/>
+              </a:schemeClr>
+            </a:solidFill>
+            <a:ln>
+              <a:noFill/>
+            </a:ln>
+          </p:spPr>
+          <p:style>
+            <a:lnRef idx="2">
+              <a:schemeClr val="accent1">
+                <a:shade val="50000"/>
+              </a:schemeClr>
+            </a:lnRef>
+            <a:fillRef idx="1">
+              <a:schemeClr val="accent1"/>
+            </a:fillRef>
+            <a:effectRef idx="0">
+              <a:schemeClr val="accent1"/>
+            </a:effectRef>
+            <a:fontRef idx="minor">
+              <a:schemeClr val="lt1"/>
+            </a:fontRef>
+          </p:style>
+          <p:txBody>
+            <a:bodyPr rtlCol="0" anchor="ctr"/>
+            <a:lstStyle/>
+            <a:p>
+              <a:pPr algn="ctr"/>
+              <a:endParaRPr lang="en-US"/>
+            </a:p>
+          </p:txBody>
+        </p:sp>
+      </p:grpSp>
+      <p:sp>
+        <p:nvSpPr>
+          <p:cNvPr id="30" name="Rectangle 29"/>
+          <p:cNvSpPr/>
+          <p:nvPr/>
+        </p:nvSpPr>
+        <p:spPr>
+          <a:xfrm>
+            <a:off x="3939724" y="1679180"/>
+            <a:ext cx="1271155" cy="1779459"/>
+          </a:xfrm>
+          <a:prstGeom prst="rect">
+            <a:avLst/>
+          </a:prstGeom>
+          <a:solidFill>
+            <a:srgbClr val="DC9600"/>
+          </a:solidFill>
+          <a:ln>
+            <a:noFill/>
+          </a:ln>
+        </p:spPr>
+        <p:style>
+          <a:lnRef idx="2">
+            <a:schemeClr val="accent1">
+              <a:shade val="50000"/>
+            </a:schemeClr>
+          </a:lnRef>
+          <a:fillRef idx="1">
+            <a:schemeClr val="accent1"/>
+          </a:fillRef>
+          <a:effectRef idx="0">
+            <a:schemeClr val="accent1"/>
+          </a:effectRef>
+          <a:fontRef idx="minor">
+            <a:schemeClr val="lt1"/>
+          </a:fontRef>
+        </p:style>
+        <p:txBody>
+          <a:bodyPr rtlCol="0" anchor="ctr"/>
+          <a:lstStyle/>
+          <a:p>
+            <a:pPr algn="ctr"/>
+            <a:endParaRPr lang="en-US"/>
+          </a:p>
+        </p:txBody>
+      </p:sp>
+      <p:sp>
+        <p:nvSpPr>
+          <p:cNvPr id="54" name="Rectangle 53"/>
+          <p:cNvSpPr/>
+          <p:nvPr/>
+        </p:nvSpPr>
+        <p:spPr>
+          <a:xfrm>
+            <a:off x="3939724" y="1618112"/>
+            <a:ext cx="113645" cy="1840528"/>
+          </a:xfrm>
+          <a:prstGeom prst="rect">
+            <a:avLst/>
+          </a:prstGeom>
+          <a:solidFill>
+            <a:srgbClr val="D7E5F5"/>
+          </a:solidFill>
+          <a:ln>
+            <a:noFill/>
+          </a:ln>
+        </p:spPr>
+        <p:style>
+          <a:lnRef idx="2">
+            <a:schemeClr val="accent1">
+              <a:shade val="50000"/>
+            </a:schemeClr>
+          </a:lnRef>
+          <a:fillRef idx="1">
+            <a:schemeClr val="accent1"/>
+          </a:fillRef>
+          <a:effectRef idx="0">
+            <a:schemeClr val="accent1"/>
+          </a:effectRef>
+          <a:fontRef idx="minor">
+            <a:schemeClr val="lt1"/>
+          </a:fontRef>
+        </p:style>
+        <p:txBody>
+          <a:bodyPr rtlCol="0" anchor="ctr"/>
+          <a:lstStyle/>
+          <a:p>
+            <a:pPr algn="ctr"/>
+            <a:endParaRPr lang="en-US"/>
+          </a:p>
+        </p:txBody>
+      </p:sp>
+      <p:sp>
+        <p:nvSpPr>
+          <p:cNvPr id="55" name="Rectangle 54"/>
+          <p:cNvSpPr/>
+          <p:nvPr/>
+        </p:nvSpPr>
+        <p:spPr>
+          <a:xfrm>
+            <a:off x="5097233" y="1618112"/>
+            <a:ext cx="113645" cy="1840528"/>
+          </a:xfrm>
+          <a:prstGeom prst="rect">
+            <a:avLst/>
+          </a:prstGeom>
+          <a:solidFill>
+            <a:srgbClr val="D7E5F5"/>
+          </a:solidFill>
+          <a:ln>
+            <a:noFill/>
+          </a:ln>
+        </p:spPr>
+        <p:style>
+          <a:lnRef idx="2">
+            <a:schemeClr val="accent1">
+              <a:shade val="50000"/>
+            </a:schemeClr>
+          </a:lnRef>
+          <a:fillRef idx="1">
+            <a:schemeClr val="accent1"/>
+          </a:fillRef>
+          <a:effectRef idx="0">
+            <a:schemeClr val="accent1"/>
+          </a:effectRef>
+          <a:fontRef idx="minor">
+            <a:schemeClr val="lt1"/>
+          </a:fontRef>
+        </p:style>
+        <p:txBody>
+          <a:bodyPr rtlCol="0" anchor="ctr"/>
+          <a:lstStyle/>
+          <a:p>
+            <a:pPr algn="ctr"/>
+            <a:endParaRPr lang="en-US"/>
+          </a:p>
+        </p:txBody>
+      </p:sp>
+      <p:sp>
+        <p:nvSpPr>
+          <p:cNvPr id="31" name="Oval 30"/>
+          <p:cNvSpPr/>
+          <p:nvPr/>
+        </p:nvSpPr>
+        <p:spPr>
+          <a:xfrm>
+            <a:off x="3678488" y="1501823"/>
+            <a:ext cx="451592" cy="451592"/>
+          </a:xfrm>
+          <a:prstGeom prst="ellipse">
+            <a:avLst/>
+          </a:prstGeom>
+          <a:solidFill>
+            <a:schemeClr val="bg1"/>
+          </a:solidFill>
+          <a:ln>
+            <a:noFill/>
+          </a:ln>
+        </p:spPr>
+        <p:style>
+          <a:lnRef idx="2">
+            <a:schemeClr val="accent1">
+              <a:shade val="50000"/>
+            </a:schemeClr>
+          </a:lnRef>
+          <a:fillRef idx="1">
+            <a:schemeClr val="accent1"/>
+          </a:fillRef>
+          <a:effectRef idx="0">
+            <a:schemeClr val="accent1"/>
+          </a:effectRef>
+          <a:fontRef idx="minor">
+            <a:schemeClr val="lt1"/>
+          </a:fontRef>
+        </p:style>
+        <p:txBody>
+          <a:bodyPr rtlCol="0" anchor="ctr"/>
+          <a:lstStyle/>
+          <a:p>
+            <a:pPr algn="ctr"/>
+            <a:endParaRPr lang="en-US"/>
+          </a:p>
+        </p:txBody>
+      </p:sp>
+      <p:sp>
+        <p:nvSpPr>
+          <p:cNvPr id="39" name="Oval 38"/>
+          <p:cNvSpPr/>
+          <p:nvPr/>
+        </p:nvSpPr>
+        <p:spPr>
+          <a:xfrm>
+            <a:off x="3922784" y="1044586"/>
+            <a:ext cx="836381" cy="836381"/>
+          </a:xfrm>
+          <a:prstGeom prst="ellipse">
+            <a:avLst/>
+          </a:prstGeom>
+          <a:solidFill>
+            <a:schemeClr val="bg1"/>
+          </a:solidFill>
+          <a:ln>
+            <a:noFill/>
+          </a:ln>
+        </p:spPr>
+        <p:style>
+          <a:lnRef idx="2">
+            <a:schemeClr val="accent1">
+              <a:shade val="50000"/>
+            </a:schemeClr>
+          </a:lnRef>
+          <a:fillRef idx="1">
+            <a:schemeClr val="accent1"/>
+          </a:fillRef>
+          <a:effectRef idx="0">
+            <a:schemeClr val="accent1"/>
+          </a:effectRef>
+          <a:fontRef idx="minor">
+            <a:schemeClr val="lt1"/>
+          </a:fontRef>
+        </p:style>
+        <p:txBody>
+          <a:bodyPr rtlCol="0" anchor="ctr"/>
+          <a:lstStyle/>
+          <a:p>
+            <a:pPr algn="ctr"/>
+            <a:endParaRPr lang="en-US"/>
+          </a:p>
+        </p:txBody>
+      </p:sp>
+      <p:sp>
+        <p:nvSpPr>
+          <p:cNvPr id="40" name="Oval 39"/>
+          <p:cNvSpPr/>
+          <p:nvPr/>
+        </p:nvSpPr>
+        <p:spPr>
+          <a:xfrm>
+            <a:off x="5019755" y="1552507"/>
+            <a:ext cx="380348" cy="380348"/>
+          </a:xfrm>
+          <a:prstGeom prst="ellipse">
+            <a:avLst/>
+          </a:prstGeom>
+          <a:solidFill>
+            <a:schemeClr val="bg1"/>
+          </a:solidFill>
+          <a:ln>
+            <a:noFill/>
+          </a:ln>
+        </p:spPr>
+        <p:style>
+          <a:lnRef idx="2">
+            <a:schemeClr val="accent1">
+              <a:shade val="50000"/>
+            </a:schemeClr>
+          </a:lnRef>
+          <a:fillRef idx="1">
+            <a:schemeClr val="accent1"/>
+          </a:fillRef>
+          <a:effectRef idx="0">
+            <a:schemeClr val="accent1"/>
+          </a:effectRef>
+          <a:fontRef idx="minor">
+            <a:schemeClr val="lt1"/>
+          </a:fontRef>
+        </p:style>
+        <p:txBody>
+          <a:bodyPr rtlCol="0" anchor="ctr"/>
+          <a:lstStyle/>
+          <a:p>
+            <a:pPr algn="ctr"/>
+            <a:endParaRPr lang="en-US"/>
+          </a:p>
+        </p:txBody>
+      </p:sp>
+      <p:sp>
+        <p:nvSpPr>
+          <p:cNvPr id="41" name="Oval 40"/>
+          <p:cNvSpPr/>
+          <p:nvPr/>
+        </p:nvSpPr>
+        <p:spPr>
+          <a:xfrm>
+            <a:off x="4629963" y="1270971"/>
+            <a:ext cx="633306" cy="633306"/>
+          </a:xfrm>
+          <a:prstGeom prst="ellipse">
+            <a:avLst/>
+          </a:prstGeom>
+          <a:solidFill>
+            <a:schemeClr val="bg1"/>
+          </a:solidFill>
+          <a:ln>
+            <a:noFill/>
+          </a:ln>
+        </p:spPr>
+        <p:style>
+          <a:lnRef idx="2">
+            <a:schemeClr val="accent1">
+              <a:shade val="50000"/>
+            </a:schemeClr>
+          </a:lnRef>
+          <a:fillRef idx="1">
+            <a:schemeClr val="accent1"/>
+          </a:fillRef>
+          <a:effectRef idx="0">
+            <a:schemeClr val="accent1"/>
+          </a:effectRef>
+          <a:fontRef idx="minor">
+            <a:schemeClr val="lt1"/>
+          </a:fontRef>
+        </p:style>
+        <p:txBody>
+          <a:bodyPr rtlCol="0" anchor="ctr"/>
+          <a:lstStyle/>
+          <a:p>
+            <a:pPr algn="ctr"/>
+            <a:endParaRPr lang="en-US"/>
+          </a:p>
+        </p:txBody>
+      </p:sp>
+      <p:sp>
+        <p:nvSpPr>
+          <p:cNvPr id="42" name="Oval 41"/>
+          <p:cNvSpPr/>
+          <p:nvPr/>
+        </p:nvSpPr>
+        <p:spPr>
+          <a:xfrm>
+            <a:off x="3772710" y="1831223"/>
+            <a:ext cx="263148" cy="263148"/>
+          </a:xfrm>
+          <a:prstGeom prst="ellipse">
+            <a:avLst/>
+          </a:prstGeom>
+          <a:solidFill>
+            <a:schemeClr val="bg1"/>
+          </a:solidFill>
+          <a:ln>
+            <a:noFill/>
+          </a:ln>
+        </p:spPr>
+        <p:style>
+          <a:lnRef idx="2">
+            <a:schemeClr val="accent1">
+              <a:shade val="50000"/>
+            </a:schemeClr>
+          </a:lnRef>
+          <a:fillRef idx="1">
+            <a:schemeClr val="accent1"/>
+          </a:fillRef>
+          <a:effectRef idx="0">
+            <a:schemeClr val="accent1"/>
+          </a:effectRef>
+          <a:fontRef idx="minor">
+            <a:schemeClr val="lt1"/>
+          </a:fontRef>
+        </p:style>
+        <p:txBody>
+          <a:bodyPr rtlCol="0" anchor="ctr"/>
+          <a:lstStyle/>
+          <a:p>
+            <a:pPr algn="ctr"/>
+            <a:endParaRPr lang="en-US"/>
+          </a:p>
+        </p:txBody>
+      </p:sp>
+      <p:sp>
+        <p:nvSpPr>
+          <p:cNvPr id="13" name="Oval 12"/>
+          <p:cNvSpPr/>
+          <p:nvPr/>
+        </p:nvSpPr>
+        <p:spPr>
+          <a:xfrm>
+            <a:off x="4628785" y="2440893"/>
+            <a:ext cx="126582" cy="128016"/>
+          </a:xfrm>
+          <a:prstGeom prst="ellipse">
+            <a:avLst/>
+          </a:prstGeom>
+          <a:solidFill>
+            <a:srgbClr val="FFC033"/>
+          </a:solidFill>
+          <a:ln>
+            <a:noFill/>
+          </a:ln>
+        </p:spPr>
+        <p:style>
+          <a:lnRef idx="2">
+            <a:schemeClr val="accent1">
+              <a:shade val="50000"/>
+            </a:schemeClr>
+          </a:lnRef>
+          <a:fillRef idx="1">
+            <a:schemeClr val="accent1"/>
+          </a:fillRef>
+          <a:effectRef idx="0">
+            <a:schemeClr val="accent1"/>
+          </a:effectRef>
+          <a:fontRef idx="minor">
+            <a:schemeClr val="lt1"/>
+          </a:fontRef>
+        </p:style>
+        <p:txBody>
+          <a:bodyPr rtlCol="0" anchor="ctr"/>
+          <a:lstStyle/>
+          <a:p>
+            <a:pPr algn="ctr"/>
+            <a:endParaRPr lang="en-US"/>
+          </a:p>
+        </p:txBody>
+      </p:sp>
+      <p:sp>
+        <p:nvSpPr>
+          <p:cNvPr id="32" name="Oval 31"/>
+          <p:cNvSpPr/>
+          <p:nvPr/>
+        </p:nvSpPr>
+        <p:spPr>
+          <a:xfrm>
+            <a:off x="4471278" y="2763037"/>
+            <a:ext cx="87713" cy="91440"/>
+          </a:xfrm>
+          <a:prstGeom prst="ellipse">
+            <a:avLst/>
+          </a:prstGeom>
+          <a:solidFill>
+            <a:srgbClr val="FFC033"/>
+          </a:solidFill>
+          <a:ln>
+            <a:noFill/>
+          </a:ln>
+        </p:spPr>
+        <p:style>
+          <a:lnRef idx="2">
+            <a:schemeClr val="accent1">
+              <a:shade val="50000"/>
+            </a:schemeClr>
+          </a:lnRef>
+          <a:fillRef idx="1">
+            <a:schemeClr val="accent1"/>
+          </a:fillRef>
+          <a:effectRef idx="0">
+            <a:schemeClr val="accent1"/>
+          </a:effectRef>
+          <a:fontRef idx="minor">
+            <a:schemeClr val="lt1"/>
+          </a:fontRef>
+        </p:style>
+        <p:txBody>
+          <a:bodyPr rtlCol="0" anchor="ctr"/>
+          <a:lstStyle/>
+          <a:p>
+            <a:pPr algn="ctr"/>
+            <a:endParaRPr lang="en-US"/>
+          </a:p>
+        </p:txBody>
+      </p:sp>
+      <p:sp>
+        <p:nvSpPr>
+          <p:cNvPr id="33" name="Oval 32"/>
+          <p:cNvSpPr/>
+          <p:nvPr/>
+        </p:nvSpPr>
+        <p:spPr>
+          <a:xfrm>
+            <a:off x="4346196" y="2178090"/>
+            <a:ext cx="162588" cy="167746"/>
+          </a:xfrm>
+          <a:prstGeom prst="ellipse">
+            <a:avLst/>
+          </a:prstGeom>
+          <a:solidFill>
+            <a:srgbClr val="FFC033"/>
+          </a:solidFill>
+          <a:ln>
+            <a:noFill/>
+          </a:ln>
+        </p:spPr>
+        <p:style>
+          <a:lnRef idx="2">
+            <a:schemeClr val="accent1">
+              <a:shade val="50000"/>
+            </a:schemeClr>
+          </a:lnRef>
+          <a:fillRef idx="1">
+            <a:schemeClr val="accent1"/>
+          </a:fillRef>
+          <a:effectRef idx="0">
+            <a:schemeClr val="accent1"/>
+          </a:effectRef>
+          <a:fontRef idx="minor">
+            <a:schemeClr val="lt1"/>
+          </a:fontRef>
+        </p:style>
+        <p:txBody>
+          <a:bodyPr rtlCol="0" anchor="ctr"/>
+          <a:lstStyle/>
+          <a:p>
+            <a:pPr algn="ctr"/>
+            <a:endParaRPr lang="en-US"/>
+          </a:p>
+        </p:txBody>
+      </p:sp>
+      <p:sp>
+        <p:nvSpPr>
+          <p:cNvPr id="35" name="Oval 34"/>
+          <p:cNvSpPr/>
+          <p:nvPr/>
+        </p:nvSpPr>
+        <p:spPr>
+          <a:xfrm>
+            <a:off x="4650722" y="2932102"/>
+            <a:ext cx="65457" cy="64008"/>
+          </a:xfrm>
+          <a:prstGeom prst="ellipse">
+            <a:avLst/>
+          </a:prstGeom>
+          <a:solidFill>
+            <a:srgbClr val="FFC033"/>
+          </a:solidFill>
+          <a:ln>
+            <a:noFill/>
+          </a:ln>
+        </p:spPr>
+        <p:style>
+          <a:lnRef idx="2">
+            <a:schemeClr val="accent1">
+              <a:shade val="50000"/>
+            </a:schemeClr>
+          </a:lnRef>
+          <a:fillRef idx="1">
+            <a:schemeClr val="accent1"/>
+          </a:fillRef>
+          <a:effectRef idx="0">
+            <a:schemeClr val="accent1"/>
+          </a:effectRef>
+          <a:fontRef idx="minor">
+            <a:schemeClr val="lt1"/>
+          </a:fontRef>
+        </p:style>
+        <p:txBody>
+          <a:bodyPr rtlCol="0" anchor="ctr"/>
+          <a:lstStyle/>
+          <a:p>
+            <a:pPr algn="ctr"/>
+            <a:endParaRPr lang="en-US"/>
+          </a:p>
+        </p:txBody>
+      </p:sp>
+      <p:sp>
+        <p:nvSpPr>
+          <p:cNvPr id="56" name="Oval 55"/>
+          <p:cNvSpPr/>
+          <p:nvPr/>
+        </p:nvSpPr>
+        <p:spPr>
+          <a:xfrm>
+            <a:off x="4569794" y="3077993"/>
+            <a:ext cx="45719" cy="45720"/>
+          </a:xfrm>
+          <a:prstGeom prst="ellipse">
+            <a:avLst/>
+          </a:prstGeom>
+          <a:solidFill>
+            <a:srgbClr val="FFC033"/>
+          </a:solidFill>
+          <a:ln>
+            <a:noFill/>
+          </a:ln>
+        </p:spPr>
+        <p:style>
+          <a:lnRef idx="2">
+            <a:schemeClr val="accent1">
+              <a:shade val="50000"/>
+            </a:schemeClr>
+          </a:lnRef>
+          <a:fillRef idx="1">
+            <a:schemeClr val="accent1"/>
+          </a:fillRef>
+          <a:effectRef idx="0">
+            <a:schemeClr val="accent1"/>
+          </a:effectRef>
+          <a:fontRef idx="minor">
+            <a:schemeClr val="lt1"/>
+          </a:fontRef>
+        </p:style>
+        <p:txBody>
+          <a:bodyPr rtlCol="0" anchor="ctr"/>
+          <a:lstStyle/>
+          <a:p>
+            <a:pPr algn="ctr"/>
+            <a:endParaRPr lang="en-US"/>
+          </a:p>
+        </p:txBody>
+      </p:sp>
+      <p:sp>
+        <p:nvSpPr>
+          <p:cNvPr id="37" name="Rectangle 36"/>
+          <p:cNvSpPr/>
+          <p:nvPr/>
+        </p:nvSpPr>
+        <p:spPr>
+          <a:xfrm>
+            <a:off x="4168721" y="2103868"/>
+            <a:ext cx="259159" cy="1097736"/>
+          </a:xfrm>
+          <a:prstGeom prst="rect">
+            <a:avLst/>
+          </a:prstGeom>
+          <a:solidFill>
+            <a:srgbClr val="FFFFFF">
+              <a:alpha val="43137"/>
+            </a:srgbClr>
+          </a:solidFill>
+          <a:ln>
+            <a:noFill/>
+          </a:ln>
+        </p:spPr>
+        <p:style>
+          <a:lnRef idx="2">
+            <a:schemeClr val="accent1">
+              <a:shade val="50000"/>
+            </a:schemeClr>
+          </a:lnRef>
+          <a:fillRef idx="1">
+            <a:schemeClr val="accent1"/>
+          </a:fillRef>
+          <a:effectRef idx="0">
+            <a:schemeClr val="accent1"/>
+          </a:effectRef>
+          <a:fontRef idx="minor">
+            <a:schemeClr val="lt1"/>
+          </a:fontRef>
+        </p:style>
+        <p:txBody>
+          <a:bodyPr rtlCol="0" anchor="ctr"/>
+          <a:lstStyle/>
+          <a:p>
+            <a:pPr algn="ctr"/>
+            <a:endParaRPr lang="en-US"/>
+          </a:p>
+        </p:txBody>
+      </p:sp>
+      <p:sp>
+        <p:nvSpPr>
+          <p:cNvPr id="58" name="Oval 57"/>
+          <p:cNvSpPr/>
+          <p:nvPr/>
+        </p:nvSpPr>
+        <p:spPr>
+          <a:xfrm>
+            <a:off x="3843147" y="2090995"/>
+            <a:ext cx="122275" cy="122275"/>
+          </a:xfrm>
+          <a:prstGeom prst="ellipse">
+            <a:avLst/>
+          </a:prstGeom>
+          <a:solidFill>
+            <a:schemeClr val="bg1"/>
+          </a:solidFill>
+          <a:ln>
+            <a:noFill/>
+          </a:ln>
+        </p:spPr>
+        <p:style>
+          <a:lnRef idx="2">
+            <a:schemeClr val="accent1">
+              <a:shade val="50000"/>
+            </a:schemeClr>
+          </a:lnRef>
+          <a:fillRef idx="1">
+            <a:schemeClr val="accent1"/>
+          </a:fillRef>
+          <a:effectRef idx="0">
+            <a:schemeClr val="accent1"/>
+          </a:effectRef>
+          <a:fontRef idx="minor">
+            <a:schemeClr val="lt1"/>
+          </a:fontRef>
+        </p:style>
+        <p:txBody>
+          <a:bodyPr rtlCol="0" anchor="ctr"/>
+          <a:lstStyle/>
+          <a:p>
+            <a:pPr algn="ctr"/>
+            <a:endParaRPr lang="en-US"/>
+          </a:p>
+        </p:txBody>
+      </p:sp>
+    </p:spTree>
+    <p:extLst>
+      <p:ext uri="{BB962C8B-B14F-4D97-AF65-F5344CB8AC3E}">
+        <p14:creationId xmlns:p14="http://schemas.microsoft.com/office/powerpoint/2010/main" val="3125769977"/>
+      </p:ext>
+    </p:extLst>
+  </p:cSld>
+  <p:clrMapOvr>
+    <a:masterClrMapping/>
+  </p:clrMapOvr>
+  <p:timing>
+    <p:tnLst>
+      <p:par>
+        <p:cTn id="1" dur="indefinite" restart="never" nodeType="tmRoot"/>
+      </p:par>
+    </p:tnLst>
+  </p:timing>
+</p:sld>
+</file>
+
 <file path=ppt/theme/theme1.xml><?xml version="1.0" encoding="utf-8"?>
 <a:theme xmlns:a="http://schemas.openxmlformats.org/drawingml/2006/main" name="Office Theme">
   <a:themeElements>

</xml_diff>